<commit_message>
revised macros2 in class
</commit_message>
<xml_diff>
--- a/ClassMaterials/Macros2/Macros 2.pptx
+++ b/ClassMaterials/Macros2/Macros 2.pptx
@@ -5,20 +5,22 @@
     <p:sldMasterId id="2147483648" r:id="rId4"/>
   </p:sldMasterIdLst>
   <p:notesMasterIdLst>
-    <p:notesMasterId r:id="rId16"/>
+    <p:notesMasterId r:id="rId18"/>
   </p:notesMasterIdLst>
   <p:sldIdLst>
     <p:sldId id="256" r:id="rId5"/>
     <p:sldId id="267" r:id="rId6"/>
-    <p:sldId id="257" r:id="rId7"/>
-    <p:sldId id="268" r:id="rId8"/>
+    <p:sldId id="268" r:id="rId7"/>
+    <p:sldId id="271" r:id="rId8"/>
     <p:sldId id="269" r:id="rId9"/>
     <p:sldId id="270" r:id="rId10"/>
-    <p:sldId id="258" r:id="rId11"/>
-    <p:sldId id="262" r:id="rId12"/>
-    <p:sldId id="259" r:id="rId13"/>
-    <p:sldId id="260" r:id="rId14"/>
-    <p:sldId id="261" r:id="rId15"/>
+    <p:sldId id="272" r:id="rId11"/>
+    <p:sldId id="257" r:id="rId12"/>
+    <p:sldId id="258" r:id="rId13"/>
+    <p:sldId id="262" r:id="rId14"/>
+    <p:sldId id="259" r:id="rId15"/>
+    <p:sldId id="260" r:id="rId16"/>
+    <p:sldId id="261" r:id="rId17"/>
   </p:sldIdLst>
   <p:sldSz cx="12192000" cy="6858000"/>
   <p:notesSz cx="6858000" cy="9144000"/>
@@ -570,7 +572,7 @@
           <a:p>
             <a:fld id="{CCE3B63A-6F9F-4ADB-85B1-22B171A73B7E}" type="datetimeFigureOut">
               <a:rPr lang="en-US" smtClean="0"/>
-              <a:t>10/13/2024</a:t>
+              <a:t>10/14/2024</a:t>
             </a:fld>
             <a:endParaRPr lang="en-US"/>
           </a:p>
@@ -1084,7 +1086,7 @@
           <a:p>
             <a:fld id="{648FFCB5-3900-45AA-AD1D-F54FBD060154}" type="datetimeFigureOut">
               <a:rPr lang="en-US" smtClean="0"/>
-              <a:t>10/13/2024</a:t>
+              <a:t>10/14/2024</a:t>
             </a:fld>
             <a:endParaRPr lang="en-US"/>
           </a:p>
@@ -1282,7 +1284,7 @@
           <a:p>
             <a:fld id="{648FFCB5-3900-45AA-AD1D-F54FBD060154}" type="datetimeFigureOut">
               <a:rPr lang="en-US" smtClean="0"/>
-              <a:t>10/13/2024</a:t>
+              <a:t>10/14/2024</a:t>
             </a:fld>
             <a:endParaRPr lang="en-US"/>
           </a:p>
@@ -1490,7 +1492,7 @@
           <a:p>
             <a:fld id="{648FFCB5-3900-45AA-AD1D-F54FBD060154}" type="datetimeFigureOut">
               <a:rPr lang="en-US" smtClean="0"/>
-              <a:t>10/13/2024</a:t>
+              <a:t>10/14/2024</a:t>
             </a:fld>
             <a:endParaRPr lang="en-US"/>
           </a:p>
@@ -1688,7 +1690,7 @@
           <a:p>
             <a:fld id="{648FFCB5-3900-45AA-AD1D-F54FBD060154}" type="datetimeFigureOut">
               <a:rPr lang="en-US" smtClean="0"/>
-              <a:t>10/13/2024</a:t>
+              <a:t>10/14/2024</a:t>
             </a:fld>
             <a:endParaRPr lang="en-US"/>
           </a:p>
@@ -1963,7 +1965,7 @@
           <a:p>
             <a:fld id="{648FFCB5-3900-45AA-AD1D-F54FBD060154}" type="datetimeFigureOut">
               <a:rPr lang="en-US" smtClean="0"/>
-              <a:t>10/13/2024</a:t>
+              <a:t>10/14/2024</a:t>
             </a:fld>
             <a:endParaRPr lang="en-US"/>
           </a:p>
@@ -2228,7 +2230,7 @@
           <a:p>
             <a:fld id="{648FFCB5-3900-45AA-AD1D-F54FBD060154}" type="datetimeFigureOut">
               <a:rPr lang="en-US" smtClean="0"/>
-              <a:t>10/13/2024</a:t>
+              <a:t>10/14/2024</a:t>
             </a:fld>
             <a:endParaRPr lang="en-US"/>
           </a:p>
@@ -2640,7 +2642,7 @@
           <a:p>
             <a:fld id="{648FFCB5-3900-45AA-AD1D-F54FBD060154}" type="datetimeFigureOut">
               <a:rPr lang="en-US" smtClean="0"/>
-              <a:t>10/13/2024</a:t>
+              <a:t>10/14/2024</a:t>
             </a:fld>
             <a:endParaRPr lang="en-US"/>
           </a:p>
@@ -2781,7 +2783,7 @@
           <a:p>
             <a:fld id="{648FFCB5-3900-45AA-AD1D-F54FBD060154}" type="datetimeFigureOut">
               <a:rPr lang="en-US" smtClean="0"/>
-              <a:t>10/13/2024</a:t>
+              <a:t>10/14/2024</a:t>
             </a:fld>
             <a:endParaRPr lang="en-US"/>
           </a:p>
@@ -2894,7 +2896,7 @@
           <a:p>
             <a:fld id="{648FFCB5-3900-45AA-AD1D-F54FBD060154}" type="datetimeFigureOut">
               <a:rPr lang="en-US" smtClean="0"/>
-              <a:t>10/13/2024</a:t>
+              <a:t>10/14/2024</a:t>
             </a:fld>
             <a:endParaRPr lang="en-US"/>
           </a:p>
@@ -3205,7 +3207,7 @@
           <a:p>
             <a:fld id="{648FFCB5-3900-45AA-AD1D-F54FBD060154}" type="datetimeFigureOut">
               <a:rPr lang="en-US" smtClean="0"/>
-              <a:t>10/13/2024</a:t>
+              <a:t>10/14/2024</a:t>
             </a:fld>
             <a:endParaRPr lang="en-US"/>
           </a:p>
@@ -3493,7 +3495,7 @@
           <a:p>
             <a:fld id="{648FFCB5-3900-45AA-AD1D-F54FBD060154}" type="datetimeFigureOut">
               <a:rPr lang="en-US" smtClean="0"/>
-              <a:t>10/13/2024</a:t>
+              <a:t>10/14/2024</a:t>
             </a:fld>
             <a:endParaRPr lang="en-US"/>
           </a:p>
@@ -3734,7 +3736,7 @@
           <a:p>
             <a:fld id="{648FFCB5-3900-45AA-AD1D-F54FBD060154}" type="datetimeFigureOut">
               <a:rPr lang="en-US" smtClean="0"/>
-              <a:t>10/13/2024</a:t>
+              <a:t>10/14/2024</a:t>
             </a:fld>
             <a:endParaRPr lang="en-US"/>
           </a:p>
@@ -4137,6 +4139,14 @@
 <file path=ppt/slides/slide1.xml><?xml version="1.0" encoding="utf-8"?>
 <p:sld xmlns:a="http://schemas.openxmlformats.org/drawingml/2006/main" xmlns:r="http://schemas.openxmlformats.org/officeDocument/2006/relationships" xmlns:p="http://schemas.openxmlformats.org/presentationml/2006/main">
   <p:cSld>
+    <p:bg>
+      <p:bgPr>
+        <a:solidFill>
+          <a:schemeClr val="bg1"/>
+        </a:solidFill>
+        <a:effectLst/>
+      </p:bgPr>
+    </p:bg>
     <p:spTree>
       <p:nvGrpSpPr>
         <p:cNvPr id="1" name=""/>
@@ -4151,6 +4161,401 @@
           <a:chExt cx="0" cy="0"/>
         </a:xfrm>
       </p:grpSpPr>
+      <p:sp useBgFill="1">
+        <p:nvSpPr>
+          <p:cNvPr id="9" name="Rectangle 8">
+            <a:extLst>
+              <a:ext uri="{FF2B5EF4-FFF2-40B4-BE49-F238E27FC236}">
+                <a16:creationId xmlns:a16="http://schemas.microsoft.com/office/drawing/2014/main" id="{5DCB5928-DC7D-4612-9922-441966E15627}"/>
+              </a:ext>
+              <a:ext uri="{C183D7F6-B498-43B3-948B-1728B52AA6E4}">
+                <adec:decorative xmlns:adec="http://schemas.microsoft.com/office/drawing/2017/decorative" val="1"/>
+              </a:ext>
+            </a:extLst>
+          </p:cNvPr>
+          <p:cNvSpPr>
+            <a:spLocks noGrp="1" noRot="1" noChangeAspect="1" noMove="1" noResize="1" noEditPoints="1" noAdjustHandles="1" noChangeArrowheads="1" noChangeShapeType="1" noTextEdit="1"/>
+          </p:cNvSpPr>
+          <p:nvPr>
+            <p:extLst>
+              <p:ext uri="{386F3935-93C4-4BCD-93E2-E3B085C9AB24}">
+                <p16:designElem xmlns:p16="http://schemas.microsoft.com/office/powerpoint/2015/main" val="1"/>
+              </p:ext>
+            </p:extLst>
+          </p:nvPr>
+        </p:nvSpPr>
+        <p:spPr>
+          <a:xfrm>
+            <a:off x="0" y="0"/>
+            <a:ext cx="12192000" cy="6858000"/>
+          </a:xfrm>
+          <a:prstGeom prst="rect">
+            <a:avLst/>
+          </a:prstGeom>
+          <a:ln>
+            <a:noFill/>
+          </a:ln>
+        </p:spPr>
+        <p:style>
+          <a:lnRef idx="2">
+            <a:schemeClr val="accent1">
+              <a:shade val="50000"/>
+            </a:schemeClr>
+          </a:lnRef>
+          <a:fillRef idx="1">
+            <a:schemeClr val="accent1"/>
+          </a:fillRef>
+          <a:effectRef idx="0">
+            <a:schemeClr val="accent1"/>
+          </a:effectRef>
+          <a:fontRef idx="minor">
+            <a:schemeClr val="lt1"/>
+          </a:fontRef>
+        </p:style>
+        <p:txBody>
+          <a:bodyPr rtlCol="0" anchor="ctr"/>
+          <a:lstStyle/>
+          <a:p>
+            <a:pPr algn="ctr"/>
+            <a:endParaRPr lang="en-US"/>
+          </a:p>
+        </p:txBody>
+      </p:sp>
+      <p:sp useBgFill="1">
+        <p:nvSpPr>
+          <p:cNvPr id="11" name="Freeform: Shape 10">
+            <a:extLst>
+              <a:ext uri="{FF2B5EF4-FFF2-40B4-BE49-F238E27FC236}">
+                <a16:creationId xmlns:a16="http://schemas.microsoft.com/office/drawing/2014/main" id="{682C1161-1736-45EC-99B7-33F3CAE9D517}"/>
+              </a:ext>
+              <a:ext uri="{C183D7F6-B498-43B3-948B-1728B52AA6E4}">
+                <adec:decorative xmlns:adec="http://schemas.microsoft.com/office/drawing/2017/decorative" val="1"/>
+              </a:ext>
+            </a:extLst>
+          </p:cNvPr>
+          <p:cNvSpPr>
+            <a:spLocks noGrp="1" noRot="1" noChangeAspect="1" noMove="1" noResize="1" noEditPoints="1" noAdjustHandles="1" noChangeArrowheads="1" noChangeShapeType="1" noTextEdit="1"/>
+          </p:cNvSpPr>
+          <p:nvPr>
+            <p:extLst>
+              <p:ext uri="{386F3935-93C4-4BCD-93E2-E3B085C9AB24}">
+                <p16:designElem xmlns:p16="http://schemas.microsoft.com/office/powerpoint/2015/main" val="1"/>
+              </p:ext>
+            </p:extLst>
+          </p:nvPr>
+        </p:nvSpPr>
+        <p:spPr>
+          <a:xfrm>
+            <a:off x="0" y="0"/>
+            <a:ext cx="4959047" cy="6858000"/>
+          </a:xfrm>
+          <a:custGeom>
+            <a:avLst/>
+            <a:gdLst>
+              <a:gd name="connsiteX0" fmla="*/ 0 w 4959047"/>
+              <a:gd name="connsiteY0" fmla="*/ 0 h 6858000"/>
+              <a:gd name="connsiteX1" fmla="*/ 4110127 w 4959047"/>
+              <a:gd name="connsiteY1" fmla="*/ 0 h 6858000"/>
+              <a:gd name="connsiteX2" fmla="*/ 4179024 w 4959047"/>
+              <a:gd name="connsiteY2" fmla="*/ 123368 h 6858000"/>
+              <a:gd name="connsiteX3" fmla="*/ 4959047 w 4959047"/>
+              <a:gd name="connsiteY3" fmla="*/ 3429000 h 6858000"/>
+              <a:gd name="connsiteX4" fmla="*/ 4179024 w 4959047"/>
+              <a:gd name="connsiteY4" fmla="*/ 6734633 h 6858000"/>
+              <a:gd name="connsiteX5" fmla="*/ 4110127 w 4959047"/>
+              <a:gd name="connsiteY5" fmla="*/ 6858000 h 6858000"/>
+              <a:gd name="connsiteX6" fmla="*/ 0 w 4959047"/>
+              <a:gd name="connsiteY6" fmla="*/ 6858000 h 6858000"/>
+            </a:gdLst>
+            <a:ahLst/>
+            <a:cxnLst>
+              <a:cxn ang="0">
+                <a:pos x="connsiteX0" y="connsiteY0"/>
+              </a:cxn>
+              <a:cxn ang="0">
+                <a:pos x="connsiteX1" y="connsiteY1"/>
+              </a:cxn>
+              <a:cxn ang="0">
+                <a:pos x="connsiteX2" y="connsiteY2"/>
+              </a:cxn>
+              <a:cxn ang="0">
+                <a:pos x="connsiteX3" y="connsiteY3"/>
+              </a:cxn>
+              <a:cxn ang="0">
+                <a:pos x="connsiteX4" y="connsiteY4"/>
+              </a:cxn>
+              <a:cxn ang="0">
+                <a:pos x="connsiteX5" y="connsiteY5"/>
+              </a:cxn>
+              <a:cxn ang="0">
+                <a:pos x="connsiteX6" y="connsiteY6"/>
+              </a:cxn>
+            </a:cxnLst>
+            <a:rect l="l" t="t" r="r" b="b"/>
+            <a:pathLst>
+              <a:path w="4959047" h="6858000">
+                <a:moveTo>
+                  <a:pt x="0" y="0"/>
+                </a:moveTo>
+                <a:lnTo>
+                  <a:pt x="4110127" y="0"/>
+                </a:lnTo>
+                <a:lnTo>
+                  <a:pt x="4179024" y="123368"/>
+                </a:lnTo>
+                <a:cubicBezTo>
+                  <a:pt x="4668929" y="1045156"/>
+                  <a:pt x="4959047" y="2189404"/>
+                  <a:pt x="4959047" y="3429000"/>
+                </a:cubicBezTo>
+                <a:cubicBezTo>
+                  <a:pt x="4959047" y="4668597"/>
+                  <a:pt x="4668929" y="5812845"/>
+                  <a:pt x="4179024" y="6734633"/>
+                </a:cubicBezTo>
+                <a:lnTo>
+                  <a:pt x="4110127" y="6858000"/>
+                </a:lnTo>
+                <a:lnTo>
+                  <a:pt x="0" y="6858000"/>
+                </a:lnTo>
+                <a:close/>
+              </a:path>
+            </a:pathLst>
+          </a:custGeom>
+          <a:ln w="9525">
+            <a:solidFill>
+              <a:srgbClr val="E6E6E6"/>
+            </a:solidFill>
+          </a:ln>
+          <a:effectLst>
+            <a:outerShdw blurRad="76200" dist="38100" algn="l" rotWithShape="0">
+              <a:schemeClr val="bg1">
+                <a:lumMod val="85000"/>
+                <a:alpha val="50000"/>
+              </a:schemeClr>
+            </a:outerShdw>
+          </a:effectLst>
+        </p:spPr>
+        <p:style>
+          <a:lnRef idx="2">
+            <a:schemeClr val="accent1">
+              <a:shade val="50000"/>
+            </a:schemeClr>
+          </a:lnRef>
+          <a:fillRef idx="1">
+            <a:schemeClr val="accent1"/>
+          </a:fillRef>
+          <a:effectRef idx="0">
+            <a:schemeClr val="accent1"/>
+          </a:effectRef>
+          <a:fontRef idx="minor">
+            <a:schemeClr val="lt1"/>
+          </a:fontRef>
+        </p:style>
+        <p:txBody>
+          <a:bodyPr wrap="square" rtlCol="0" anchor="ctr">
+            <a:noAutofit/>
+          </a:bodyPr>
+          <a:lstStyle/>
+          <a:p>
+            <a:pPr marL="0" marR="0" lvl="0" indent="0" algn="ctr" defTabSz="914400" rtl="0" eaLnBrk="1" fontAlgn="auto" latinLnBrk="0" hangingPunct="1">
+              <a:lnSpc>
+                <a:spcPct val="100000"/>
+              </a:lnSpc>
+              <a:spcBef>
+                <a:spcPts val="0"/>
+              </a:spcBef>
+              <a:spcAft>
+                <a:spcPts val="0"/>
+              </a:spcAft>
+              <a:buClrTx/>
+              <a:buSzTx/>
+              <a:buFontTx/>
+              <a:buNone/>
+              <a:tabLst/>
+              <a:defRPr/>
+            </a:pPr>
+            <a:endParaRPr kumimoji="0" lang="en-US" sz="1800" b="0" i="0" u="none" strike="noStrike" kern="1200" cap="none" spc="0" normalizeH="0" baseline="0" noProof="0">
+              <a:ln>
+                <a:noFill/>
+              </a:ln>
+              <a:solidFill>
+                <a:prstClr val="white"/>
+              </a:solidFill>
+              <a:effectLst/>
+              <a:uLnTx/>
+              <a:uFillTx/>
+              <a:latin typeface="Calibri" panose="020F0502020204030204"/>
+              <a:ea typeface="+mn-ea"/>
+              <a:cs typeface="+mn-cs"/>
+            </a:endParaRPr>
+          </a:p>
+        </p:txBody>
+      </p:sp>
+      <p:sp useBgFill="1">
+        <p:nvSpPr>
+          <p:cNvPr id="13" name="Freeform: Shape 12">
+            <a:extLst>
+              <a:ext uri="{FF2B5EF4-FFF2-40B4-BE49-F238E27FC236}">
+                <a16:creationId xmlns:a16="http://schemas.microsoft.com/office/drawing/2014/main" id="{84D4DDB8-B68F-45B0-9F62-C4279996F672}"/>
+              </a:ext>
+              <a:ext uri="{C183D7F6-B498-43B3-948B-1728B52AA6E4}">
+                <adec:decorative xmlns:adec="http://schemas.microsoft.com/office/drawing/2017/decorative" val="1"/>
+              </a:ext>
+            </a:extLst>
+          </p:cNvPr>
+          <p:cNvSpPr>
+            <a:spLocks noGrp="1" noRot="1" noChangeAspect="1" noMove="1" noResize="1" noEditPoints="1" noAdjustHandles="1" noChangeArrowheads="1" noChangeShapeType="1" noTextEdit="1"/>
+          </p:cNvSpPr>
+          <p:nvPr>
+            <p:extLst>
+              <p:ext uri="{386F3935-93C4-4BCD-93E2-E3B085C9AB24}">
+                <p16:designElem xmlns:p16="http://schemas.microsoft.com/office/powerpoint/2015/main" val="1"/>
+              </p:ext>
+            </p:extLst>
+          </p:nvPr>
+        </p:nvSpPr>
+        <p:spPr>
+          <a:xfrm>
+            <a:off x="0" y="0"/>
+            <a:ext cx="4948887" cy="6858000"/>
+          </a:xfrm>
+          <a:custGeom>
+            <a:avLst/>
+            <a:gdLst>
+              <a:gd name="connsiteX0" fmla="*/ 0 w 4948887"/>
+              <a:gd name="connsiteY0" fmla="*/ 0 h 6858000"/>
+              <a:gd name="connsiteX1" fmla="*/ 4099967 w 4948887"/>
+              <a:gd name="connsiteY1" fmla="*/ 0 h 6858000"/>
+              <a:gd name="connsiteX2" fmla="*/ 4168864 w 4948887"/>
+              <a:gd name="connsiteY2" fmla="*/ 123368 h 6858000"/>
+              <a:gd name="connsiteX3" fmla="*/ 4948887 w 4948887"/>
+              <a:gd name="connsiteY3" fmla="*/ 3429000 h 6858000"/>
+              <a:gd name="connsiteX4" fmla="*/ 4168864 w 4948887"/>
+              <a:gd name="connsiteY4" fmla="*/ 6734633 h 6858000"/>
+              <a:gd name="connsiteX5" fmla="*/ 4099967 w 4948887"/>
+              <a:gd name="connsiteY5" fmla="*/ 6858000 h 6858000"/>
+              <a:gd name="connsiteX6" fmla="*/ 0 w 4948887"/>
+              <a:gd name="connsiteY6" fmla="*/ 6858000 h 6858000"/>
+            </a:gdLst>
+            <a:ahLst/>
+            <a:cxnLst>
+              <a:cxn ang="0">
+                <a:pos x="connsiteX0" y="connsiteY0"/>
+              </a:cxn>
+              <a:cxn ang="0">
+                <a:pos x="connsiteX1" y="connsiteY1"/>
+              </a:cxn>
+              <a:cxn ang="0">
+                <a:pos x="connsiteX2" y="connsiteY2"/>
+              </a:cxn>
+              <a:cxn ang="0">
+                <a:pos x="connsiteX3" y="connsiteY3"/>
+              </a:cxn>
+              <a:cxn ang="0">
+                <a:pos x="connsiteX4" y="connsiteY4"/>
+              </a:cxn>
+              <a:cxn ang="0">
+                <a:pos x="connsiteX5" y="connsiteY5"/>
+              </a:cxn>
+              <a:cxn ang="0">
+                <a:pos x="connsiteX6" y="connsiteY6"/>
+              </a:cxn>
+            </a:cxnLst>
+            <a:rect l="l" t="t" r="r" b="b"/>
+            <a:pathLst>
+              <a:path w="4948887" h="6858000">
+                <a:moveTo>
+                  <a:pt x="0" y="0"/>
+                </a:moveTo>
+                <a:lnTo>
+                  <a:pt x="4099967" y="0"/>
+                </a:lnTo>
+                <a:lnTo>
+                  <a:pt x="4168864" y="123368"/>
+                </a:lnTo>
+                <a:cubicBezTo>
+                  <a:pt x="4658769" y="1045156"/>
+                  <a:pt x="4948887" y="2189404"/>
+                  <a:pt x="4948887" y="3429000"/>
+                </a:cubicBezTo>
+                <a:cubicBezTo>
+                  <a:pt x="4948887" y="4668597"/>
+                  <a:pt x="4658769" y="5812845"/>
+                  <a:pt x="4168864" y="6734633"/>
+                </a:cubicBezTo>
+                <a:lnTo>
+                  <a:pt x="4099967" y="6858000"/>
+                </a:lnTo>
+                <a:lnTo>
+                  <a:pt x="0" y="6858000"/>
+                </a:lnTo>
+                <a:close/>
+              </a:path>
+            </a:pathLst>
+          </a:custGeom>
+          <a:ln w="9525">
+            <a:noFill/>
+          </a:ln>
+          <a:effectLst/>
+        </p:spPr>
+        <p:style>
+          <a:lnRef idx="2">
+            <a:schemeClr val="accent1">
+              <a:shade val="50000"/>
+            </a:schemeClr>
+          </a:lnRef>
+          <a:fillRef idx="1">
+            <a:schemeClr val="accent1"/>
+          </a:fillRef>
+          <a:effectRef idx="0">
+            <a:schemeClr val="accent1"/>
+          </a:effectRef>
+          <a:fontRef idx="minor">
+            <a:schemeClr val="lt1"/>
+          </a:fontRef>
+        </p:style>
+        <p:txBody>
+          <a:bodyPr wrap="square" rtlCol="0" anchor="ctr">
+            <a:noAutofit/>
+          </a:bodyPr>
+          <a:lstStyle/>
+          <a:p>
+            <a:pPr marL="0" marR="0" lvl="0" indent="0" algn="ctr" defTabSz="914400" rtl="0" eaLnBrk="1" fontAlgn="auto" latinLnBrk="0" hangingPunct="1">
+              <a:lnSpc>
+                <a:spcPct val="100000"/>
+              </a:lnSpc>
+              <a:spcBef>
+                <a:spcPts val="0"/>
+              </a:spcBef>
+              <a:spcAft>
+                <a:spcPts val="0"/>
+              </a:spcAft>
+              <a:buClrTx/>
+              <a:buSzTx/>
+              <a:buFontTx/>
+              <a:buNone/>
+              <a:tabLst/>
+              <a:defRPr/>
+            </a:pPr>
+            <a:endParaRPr kumimoji="0" lang="en-US" sz="1800" b="0" i="0" u="none" strike="noStrike" kern="1200" cap="none" spc="0" normalizeH="0" baseline="0" noProof="0">
+              <a:ln>
+                <a:noFill/>
+              </a:ln>
+              <a:solidFill>
+                <a:prstClr val="white"/>
+              </a:solidFill>
+              <a:effectLst/>
+              <a:uLnTx/>
+              <a:uFillTx/>
+              <a:latin typeface="Calibri" panose="020F0502020204030204"/>
+              <a:ea typeface="+mn-ea"/>
+              <a:cs typeface="+mn-cs"/>
+            </a:endParaRPr>
+          </a:p>
+        </p:txBody>
+      </p:sp>
       <p:sp>
         <p:nvSpPr>
           <p:cNvPr id="2" name="Title 1">
@@ -4167,13 +4572,21 @@
             <p:ph type="ctrTitle"/>
           </p:nvPr>
         </p:nvSpPr>
-        <p:spPr/>
-        <p:txBody>
-          <a:bodyPr/>
-          <a:lstStyle/>
-          <a:p>
-            <a:r>
-              <a:rPr lang="en-US" dirty="0"/>
+        <p:spPr>
+          <a:xfrm>
+            <a:off x="477981" y="1122363"/>
+            <a:ext cx="4023360" cy="3204134"/>
+          </a:xfrm>
+        </p:spPr>
+        <p:txBody>
+          <a:bodyPr anchor="b">
+            <a:normAutofit/>
+          </a:bodyPr>
+          <a:lstStyle/>
+          <a:p>
+            <a:pPr algn="l"/>
+            <a:r>
+              <a:rPr lang="en-US" sz="4800"/>
               <a:t>Macros 2</a:t>
             </a:r>
           </a:p>
@@ -4195,15 +4608,214 @@
             <p:ph type="subTitle" idx="1"/>
           </p:nvPr>
         </p:nvSpPr>
-        <p:spPr/>
-        <p:txBody>
-          <a:bodyPr/>
-          <a:lstStyle/>
-          <a:p>
-            <a:endParaRPr lang="en-US"/>
-          </a:p>
-        </p:txBody>
-      </p:sp>
+        <p:spPr>
+          <a:xfrm>
+            <a:off x="477981" y="4872922"/>
+            <a:ext cx="3933306" cy="1208141"/>
+          </a:xfrm>
+        </p:spPr>
+        <p:txBody>
+          <a:bodyPr>
+            <a:normAutofit/>
+          </a:bodyPr>
+          <a:lstStyle/>
+          <a:p>
+            <a:pPr algn="l"/>
+            <a:endParaRPr lang="en-US" sz="2000"/>
+          </a:p>
+        </p:txBody>
+      </p:sp>
+      <p:sp>
+        <p:nvSpPr>
+          <p:cNvPr id="15" name="Rectangle 14">
+            <a:extLst>
+              <a:ext uri="{FF2B5EF4-FFF2-40B4-BE49-F238E27FC236}">
+                <a16:creationId xmlns:a16="http://schemas.microsoft.com/office/drawing/2014/main" id="{AF2F604E-43BE-4DC3-B983-E071523364F8}"/>
+              </a:ext>
+              <a:ext uri="{C183D7F6-B498-43B3-948B-1728B52AA6E4}">
+                <adec:decorative xmlns:adec="http://schemas.microsoft.com/office/drawing/2017/decorative" val="1"/>
+              </a:ext>
+            </a:extLst>
+          </p:cNvPr>
+          <p:cNvSpPr>
+            <a:spLocks noGrp="1" noRot="1" noChangeAspect="1" noMove="1" noResize="1" noEditPoints="1" noAdjustHandles="1" noChangeArrowheads="1" noChangeShapeType="1" noTextEdit="1"/>
+          </p:cNvSpPr>
+          <p:nvPr>
+            <p:extLst>
+              <p:ext uri="{386F3935-93C4-4BCD-93E2-E3B085C9AB24}">
+                <p16:designElem xmlns:p16="http://schemas.microsoft.com/office/powerpoint/2015/main" val="1"/>
+              </p:ext>
+            </p:extLst>
+          </p:nvPr>
+        </p:nvSpPr>
+        <p:spPr>
+          <a:xfrm rot="5400000">
+            <a:off x="759921" y="346791"/>
+            <a:ext cx="146304" cy="704088"/>
+          </a:xfrm>
+          <a:prstGeom prst="rect">
+            <a:avLst/>
+          </a:prstGeom>
+          <a:solidFill>
+            <a:schemeClr val="accent2"/>
+          </a:solidFill>
+          <a:ln>
+            <a:noFill/>
+          </a:ln>
+        </p:spPr>
+        <p:style>
+          <a:lnRef idx="2">
+            <a:schemeClr val="accent1">
+              <a:shade val="50000"/>
+            </a:schemeClr>
+          </a:lnRef>
+          <a:fillRef idx="1">
+            <a:schemeClr val="accent1"/>
+          </a:fillRef>
+          <a:effectRef idx="0">
+            <a:schemeClr val="accent1"/>
+          </a:effectRef>
+          <a:fontRef idx="minor">
+            <a:schemeClr val="lt1"/>
+          </a:fontRef>
+        </p:style>
+        <p:txBody>
+          <a:bodyPr rtlCol="0" anchor="ctr"/>
+          <a:lstStyle/>
+          <a:p>
+            <a:pPr algn="ctr"/>
+            <a:endParaRPr lang="en-US">
+              <a:solidFill>
+                <a:prstClr val="white"/>
+              </a:solidFill>
+              <a:latin typeface="Calibri" panose="020F0502020204030204"/>
+            </a:endParaRPr>
+          </a:p>
+        </p:txBody>
+      </p:sp>
+      <p:sp>
+        <p:nvSpPr>
+          <p:cNvPr id="17" name="Rectangle 16">
+            <a:extLst>
+              <a:ext uri="{FF2B5EF4-FFF2-40B4-BE49-F238E27FC236}">
+                <a16:creationId xmlns:a16="http://schemas.microsoft.com/office/drawing/2014/main" id="{08C9B587-E65E-4B52-B37C-ABEBB6E87928}"/>
+              </a:ext>
+              <a:ext uri="{C183D7F6-B498-43B3-948B-1728B52AA6E4}">
+                <adec:decorative xmlns:adec="http://schemas.microsoft.com/office/drawing/2017/decorative" val="1"/>
+              </a:ext>
+            </a:extLst>
+          </p:cNvPr>
+          <p:cNvSpPr>
+            <a:spLocks noGrp="1" noRot="1" noChangeAspect="1" noMove="1" noResize="1" noEditPoints="1" noAdjustHandles="1" noChangeArrowheads="1" noChangeShapeType="1" noTextEdit="1"/>
+          </p:cNvSpPr>
+          <p:nvPr>
+            <p:extLst>
+              <p:ext uri="{386F3935-93C4-4BCD-93E2-E3B085C9AB24}">
+                <p16:designElem xmlns:p16="http://schemas.microsoft.com/office/powerpoint/2015/main" val="1"/>
+              </p:ext>
+            </p:extLst>
+          </p:nvPr>
+        </p:nvSpPr>
+        <p:spPr>
+          <a:xfrm>
+            <a:off x="481029" y="4546920"/>
+            <a:ext cx="4023360" cy="18288"/>
+          </a:xfrm>
+          <a:prstGeom prst="rect">
+            <a:avLst/>
+          </a:prstGeom>
+          <a:solidFill>
+            <a:srgbClr val="D5D5D5"/>
+          </a:solidFill>
+          <a:ln w="3175">
+            <a:noFill/>
+          </a:ln>
+          <a:effectLst/>
+        </p:spPr>
+        <p:style>
+          <a:lnRef idx="2">
+            <a:schemeClr val="accent1">
+              <a:shade val="50000"/>
+            </a:schemeClr>
+          </a:lnRef>
+          <a:fillRef idx="1">
+            <a:schemeClr val="accent1"/>
+          </a:fillRef>
+          <a:effectRef idx="0">
+            <a:schemeClr val="accent1"/>
+          </a:effectRef>
+          <a:fontRef idx="minor">
+            <a:schemeClr val="lt1"/>
+          </a:fontRef>
+        </p:style>
+        <p:txBody>
+          <a:bodyPr rtlCol="0" anchor="ctr"/>
+          <a:lstStyle/>
+          <a:p>
+            <a:pPr marL="0" marR="0" lvl="0" indent="0" algn="ctr" defTabSz="914400" rtl="0" eaLnBrk="1" fontAlgn="auto" latinLnBrk="0" hangingPunct="1">
+              <a:lnSpc>
+                <a:spcPct val="100000"/>
+              </a:lnSpc>
+              <a:spcBef>
+                <a:spcPts val="0"/>
+              </a:spcBef>
+              <a:spcAft>
+                <a:spcPts val="0"/>
+              </a:spcAft>
+              <a:buClrTx/>
+              <a:buSzTx/>
+              <a:buFontTx/>
+              <a:buNone/>
+              <a:tabLst/>
+              <a:defRPr/>
+            </a:pPr>
+            <a:endParaRPr kumimoji="0" lang="en-US" sz="1800" b="0" i="0" u="none" strike="noStrike" kern="1200" cap="none" spc="0" normalizeH="0" baseline="0" noProof="0">
+              <a:ln>
+                <a:noFill/>
+              </a:ln>
+              <a:solidFill>
+                <a:prstClr val="white"/>
+              </a:solidFill>
+              <a:effectLst/>
+              <a:uLnTx/>
+              <a:uFillTx/>
+              <a:latin typeface="Calibri" panose="020F0502020204030204"/>
+              <a:ea typeface="+mn-ea"/>
+              <a:cs typeface="+mn-cs"/>
+            </a:endParaRPr>
+          </a:p>
+        </p:txBody>
+      </p:sp>
+      <p:pic>
+        <p:nvPicPr>
+          <p:cNvPr id="4" name="Picture 3">
+            <a:extLst>
+              <a:ext uri="{FF2B5EF4-FFF2-40B4-BE49-F238E27FC236}">
+                <a16:creationId xmlns:a16="http://schemas.microsoft.com/office/drawing/2014/main" id="{44210458-E972-656E-208E-EA899C1A6933}"/>
+              </a:ext>
+            </a:extLst>
+          </p:cNvPr>
+          <p:cNvPicPr>
+            <a:picLocks noChangeAspect="1"/>
+          </p:cNvPicPr>
+          <p:nvPr/>
+        </p:nvPicPr>
+        <p:blipFill>
+          <a:blip r:embed="rId2"/>
+          <a:stretch>
+            <a:fillRect/>
+          </a:stretch>
+        </p:blipFill>
+        <p:spPr>
+          <a:xfrm>
+            <a:off x="5891084" y="625684"/>
+            <a:ext cx="5455380" cy="5455380"/>
+          </a:xfrm>
+          <a:prstGeom prst="rect">
+            <a:avLst/>
+          </a:prstGeom>
+        </p:spPr>
+      </p:pic>
     </p:spTree>
     <p:extLst>
       <p:ext uri="{BB962C8B-B14F-4D97-AF65-F5344CB8AC3E}">
@@ -4218,6 +4830,518 @@
 </file>
 
 <file path=ppt/slides/slide10.xml><?xml version="1.0" encoding="utf-8"?>
+<p:sld xmlns:a="http://schemas.openxmlformats.org/drawingml/2006/main" xmlns:r="http://schemas.openxmlformats.org/officeDocument/2006/relationships" xmlns:p="http://schemas.openxmlformats.org/presentationml/2006/main">
+  <p:cSld>
+    <p:spTree>
+      <p:nvGrpSpPr>
+        <p:cNvPr id="1" name=""/>
+        <p:cNvGrpSpPr/>
+        <p:nvPr/>
+      </p:nvGrpSpPr>
+      <p:grpSpPr>
+        <a:xfrm>
+          <a:off x="0" y="0"/>
+          <a:ext cx="0" cy="0"/>
+          <a:chOff x="0" y="0"/>
+          <a:chExt cx="0" cy="0"/>
+        </a:xfrm>
+      </p:grpSpPr>
+      <p:sp>
+        <p:nvSpPr>
+          <p:cNvPr id="2" name="Title 1">
+            <a:extLst>
+              <a:ext uri="{FF2B5EF4-FFF2-40B4-BE49-F238E27FC236}">
+                <a16:creationId xmlns:a16="http://schemas.microsoft.com/office/drawing/2014/main" id="{3AF57412-F958-44E1-BD9C-13649DD46B23}"/>
+              </a:ext>
+            </a:extLst>
+          </p:cNvPr>
+          <p:cNvSpPr>
+            <a:spLocks noGrp="1"/>
+          </p:cNvSpPr>
+          <p:nvPr>
+            <p:ph type="title"/>
+          </p:nvPr>
+        </p:nvSpPr>
+        <p:spPr/>
+        <p:txBody>
+          <a:bodyPr/>
+          <a:lstStyle/>
+          <a:p>
+            <a:r>
+              <a:rPr lang="en-US" dirty="0"/>
+              <a:t>2 Types of Variable Captures Problems</a:t>
+            </a:r>
+          </a:p>
+        </p:txBody>
+      </p:sp>
+      <p:sp>
+        <p:nvSpPr>
+          <p:cNvPr id="3" name="Content Placeholder 2">
+            <a:extLst>
+              <a:ext uri="{FF2B5EF4-FFF2-40B4-BE49-F238E27FC236}">
+                <a16:creationId xmlns:a16="http://schemas.microsoft.com/office/drawing/2014/main" id="{4D5B56F0-33E9-4916-97D2-8C007D15AEC4}"/>
+              </a:ext>
+            </a:extLst>
+          </p:cNvPr>
+          <p:cNvSpPr>
+            <a:spLocks noGrp="1"/>
+          </p:cNvSpPr>
+          <p:nvPr>
+            <p:ph idx="1"/>
+          </p:nvPr>
+        </p:nvSpPr>
+        <p:spPr/>
+        <p:txBody>
+          <a:bodyPr>
+            <a:normAutofit/>
+          </a:bodyPr>
+          <a:lstStyle/>
+          <a:p>
+            <a:pPr marL="0" indent="0">
+              <a:buNone/>
+            </a:pPr>
+            <a:r>
+              <a:rPr lang="en-US" dirty="0"/>
+              <a:t>A variable created by the macro “captures” some name that has meaning to the program that calls the macro and changes it</a:t>
+            </a:r>
+          </a:p>
+          <a:p>
+            <a:pPr marL="0" indent="0">
+              <a:buNone/>
+            </a:pPr>
+            <a:endParaRPr lang="en-US" dirty="0"/>
+          </a:p>
+          <a:p>
+            <a:pPr marL="0" indent="0">
+              <a:buNone/>
+            </a:pPr>
+            <a:r>
+              <a:rPr lang="en-US" dirty="0"/>
+              <a:t>The local context in which the macro is called “captures” some free variable intended to be global context from where the macro was declared</a:t>
+            </a:r>
+          </a:p>
+          <a:p>
+            <a:pPr marL="0" indent="0">
+              <a:buNone/>
+            </a:pPr>
+            <a:endParaRPr lang="en-US" dirty="0"/>
+          </a:p>
+          <a:p>
+            <a:pPr marL="0" indent="0">
+              <a:buNone/>
+            </a:pPr>
+            <a:r>
+              <a:rPr lang="en-US" dirty="0">
+                <a:latin typeface="Consolas" panose="020B0609020204030204" pitchFamily="49" charset="0"/>
+              </a:rPr>
+              <a:t>(let ((set! '(1 2 3)))</a:t>
+            </a:r>
+          </a:p>
+          <a:p>
+            <a:pPr marL="0" indent="0">
+              <a:buNone/>
+            </a:pPr>
+            <a:r>
+              <a:rPr lang="en-US" dirty="0">
+                <a:latin typeface="Consolas" panose="020B0609020204030204" pitchFamily="49" charset="0"/>
+              </a:rPr>
+              <a:t>  (</a:t>
+            </a:r>
+            <a:r>
+              <a:rPr lang="en-US" dirty="0" err="1">
+                <a:latin typeface="Consolas" panose="020B0609020204030204" pitchFamily="49" charset="0"/>
+              </a:rPr>
+              <a:t>badswap</a:t>
+            </a:r>
+            <a:r>
+              <a:rPr lang="en-US" dirty="0">
+                <a:latin typeface="Consolas" panose="020B0609020204030204" pitchFamily="49" charset="0"/>
+              </a:rPr>
+              <a:t> a b))</a:t>
+            </a:r>
+          </a:p>
+        </p:txBody>
+      </p:sp>
+    </p:spTree>
+    <p:extLst>
+      <p:ext uri="{BB962C8B-B14F-4D97-AF65-F5344CB8AC3E}">
+        <p14:creationId xmlns:p14="http://schemas.microsoft.com/office/powerpoint/2010/main" val="1153656585"/>
+      </p:ext>
+    </p:extLst>
+  </p:cSld>
+  <p:clrMapOvr>
+    <a:masterClrMapping/>
+  </p:clrMapOvr>
+</p:sld>
+</file>
+
+<file path=ppt/slides/slide11.xml><?xml version="1.0" encoding="utf-8"?>
+<p:sld xmlns:a="http://schemas.openxmlformats.org/drawingml/2006/main" xmlns:r="http://schemas.openxmlformats.org/officeDocument/2006/relationships" xmlns:p="http://schemas.openxmlformats.org/presentationml/2006/main">
+  <p:cSld>
+    <p:spTree>
+      <p:nvGrpSpPr>
+        <p:cNvPr id="1" name=""/>
+        <p:cNvGrpSpPr/>
+        <p:nvPr/>
+      </p:nvGrpSpPr>
+      <p:grpSpPr>
+        <a:xfrm>
+          <a:off x="0" y="0"/>
+          <a:ext cx="0" cy="0"/>
+          <a:chOff x="0" y="0"/>
+          <a:chExt cx="0" cy="0"/>
+        </a:xfrm>
+      </p:grpSpPr>
+      <p:sp>
+        <p:nvSpPr>
+          <p:cNvPr id="4" name="Rectangle 3">
+            <a:extLst>
+              <a:ext uri="{FF2B5EF4-FFF2-40B4-BE49-F238E27FC236}">
+                <a16:creationId xmlns:a16="http://schemas.microsoft.com/office/drawing/2014/main" id="{A24BF837-4241-463D-9326-D6E299214759}"/>
+              </a:ext>
+            </a:extLst>
+          </p:cNvPr>
+          <p:cNvSpPr/>
+          <p:nvPr/>
+        </p:nvSpPr>
+        <p:spPr>
+          <a:xfrm>
+            <a:off x="1103452" y="2246968"/>
+            <a:ext cx="8688729" cy="3416320"/>
+          </a:xfrm>
+          <a:prstGeom prst="rect">
+            <a:avLst/>
+          </a:prstGeom>
+        </p:spPr>
+        <p:txBody>
+          <a:bodyPr wrap="square">
+            <a:spAutoFit/>
+          </a:bodyPr>
+          <a:lstStyle/>
+          <a:p>
+            <a:r>
+              <a:rPr lang="en-US" sz="3600" dirty="0">
+                <a:latin typeface="Consolas" panose="020B0609020204030204" pitchFamily="49" charset="0"/>
+              </a:rPr>
+              <a:t>(define-syntax (swap </a:t>
+            </a:r>
+            <a:r>
+              <a:rPr lang="en-US" sz="3600" dirty="0" err="1">
+                <a:latin typeface="Consolas" panose="020B0609020204030204" pitchFamily="49" charset="0"/>
+              </a:rPr>
+              <a:t>stx</a:t>
+            </a:r>
+            <a:r>
+              <a:rPr lang="en-US" sz="3600" dirty="0">
+                <a:latin typeface="Consolas" panose="020B0609020204030204" pitchFamily="49" charset="0"/>
+              </a:rPr>
+              <a:t>)</a:t>
+            </a:r>
+          </a:p>
+          <a:p>
+            <a:r>
+              <a:rPr lang="en-US" sz="3600" dirty="0">
+                <a:latin typeface="Consolas" panose="020B0609020204030204" pitchFamily="49" charset="0"/>
+              </a:rPr>
+              <a:t>  (syntax-case </a:t>
+            </a:r>
+            <a:r>
+              <a:rPr lang="en-US" sz="3600" dirty="0" err="1">
+                <a:latin typeface="Consolas" panose="020B0609020204030204" pitchFamily="49" charset="0"/>
+              </a:rPr>
+              <a:t>stx</a:t>
+            </a:r>
+            <a:r>
+              <a:rPr lang="en-US" sz="3600" dirty="0">
+                <a:latin typeface="Consolas" panose="020B0609020204030204" pitchFamily="49" charset="0"/>
+              </a:rPr>
+              <a:t> ()</a:t>
+            </a:r>
+          </a:p>
+          <a:p>
+            <a:r>
+              <a:rPr lang="en-US" sz="3600" dirty="0">
+                <a:latin typeface="Consolas" panose="020B0609020204030204" pitchFamily="49" charset="0"/>
+              </a:rPr>
+              <a:t>    [(swap x y)</a:t>
+            </a:r>
+          </a:p>
+          <a:p>
+            <a:r>
+              <a:rPr lang="en-US" sz="3600" dirty="0">
+                <a:latin typeface="Consolas" panose="020B0609020204030204" pitchFamily="49" charset="0"/>
+              </a:rPr>
+              <a:t>     #'(let ([</a:t>
+            </a:r>
+            <a:r>
+              <a:rPr lang="en-US" sz="3600" dirty="0" err="1">
+                <a:latin typeface="Consolas" panose="020B0609020204030204" pitchFamily="49" charset="0"/>
+              </a:rPr>
+              <a:t>tmp</a:t>
+            </a:r>
+            <a:r>
+              <a:rPr lang="en-US" sz="3600" dirty="0">
+                <a:latin typeface="Consolas" panose="020B0609020204030204" pitchFamily="49" charset="0"/>
+              </a:rPr>
+              <a:t> x])</a:t>
+            </a:r>
+          </a:p>
+          <a:p>
+            <a:r>
+              <a:rPr lang="en-US" sz="3600" dirty="0">
+                <a:latin typeface="Consolas" panose="020B0609020204030204" pitchFamily="49" charset="0"/>
+              </a:rPr>
+              <a:t>         (set! x y)</a:t>
+            </a:r>
+          </a:p>
+          <a:p>
+            <a:r>
+              <a:rPr lang="en-US" sz="3600" dirty="0">
+                <a:latin typeface="Consolas" panose="020B0609020204030204" pitchFamily="49" charset="0"/>
+              </a:rPr>
+              <a:t>         (set! y </a:t>
+            </a:r>
+            <a:r>
+              <a:rPr lang="en-US" sz="3600" dirty="0" err="1">
+                <a:latin typeface="Consolas" panose="020B0609020204030204" pitchFamily="49" charset="0"/>
+              </a:rPr>
+              <a:t>tmp</a:t>
+            </a:r>
+            <a:r>
+              <a:rPr lang="en-US" sz="3600" dirty="0">
+                <a:latin typeface="Consolas" panose="020B0609020204030204" pitchFamily="49" charset="0"/>
+              </a:rPr>
+              <a:t>))]))</a:t>
+            </a:r>
+          </a:p>
+        </p:txBody>
+      </p:sp>
+      <p:sp>
+        <p:nvSpPr>
+          <p:cNvPr id="6" name="Callout: Line 5">
+            <a:extLst>
+              <a:ext uri="{FF2B5EF4-FFF2-40B4-BE49-F238E27FC236}">
+                <a16:creationId xmlns:a16="http://schemas.microsoft.com/office/drawing/2014/main" id="{2CBE7812-8F67-4DD1-8FD8-4E2CC7EEBF31}"/>
+              </a:ext>
+            </a:extLst>
+          </p:cNvPr>
+          <p:cNvSpPr/>
+          <p:nvPr/>
+        </p:nvSpPr>
+        <p:spPr>
+          <a:xfrm>
+            <a:off x="7812912" y="2409014"/>
+            <a:ext cx="3368233" cy="1182032"/>
+          </a:xfrm>
+          <a:prstGeom prst="borderCallout1">
+            <a:avLst>
+              <a:gd name="adj1" fmla="val 39314"/>
+              <a:gd name="adj2" fmla="val 1289"/>
+              <a:gd name="adj3" fmla="val 109562"/>
+              <a:gd name="adj4" fmla="val -104656"/>
+            </a:avLst>
+          </a:prstGeom>
+          <a:solidFill>
+            <a:schemeClr val="accent1">
+              <a:lumMod val="20000"/>
+              <a:lumOff val="80000"/>
+            </a:schemeClr>
+          </a:solidFill>
+        </p:spPr>
+        <p:style>
+          <a:lnRef idx="2">
+            <a:schemeClr val="dk1"/>
+          </a:lnRef>
+          <a:fillRef idx="1">
+            <a:schemeClr val="lt1"/>
+          </a:fillRef>
+          <a:effectRef idx="0">
+            <a:schemeClr val="dk1"/>
+          </a:effectRef>
+          <a:fontRef idx="minor">
+            <a:schemeClr val="dk1"/>
+          </a:fontRef>
+        </p:style>
+        <p:txBody>
+          <a:bodyPr rtlCol="0" anchor="ctr"/>
+          <a:lstStyle/>
+          <a:p>
+            <a:pPr algn="ctr"/>
+            <a:r>
+              <a:rPr lang="en-US" dirty="0"/>
+              <a:t>X and Y and syntax objects with their own namespace</a:t>
+            </a:r>
+          </a:p>
+        </p:txBody>
+      </p:sp>
+      <p:sp>
+        <p:nvSpPr>
+          <p:cNvPr id="7" name="Callout: Line 6">
+            <a:extLst>
+              <a:ext uri="{FF2B5EF4-FFF2-40B4-BE49-F238E27FC236}">
+                <a16:creationId xmlns:a16="http://schemas.microsoft.com/office/drawing/2014/main" id="{0EDBC9F2-1F3E-49FD-9D40-D288ACD7D710}"/>
+              </a:ext>
+            </a:extLst>
+          </p:cNvPr>
+          <p:cNvSpPr/>
+          <p:nvPr/>
+        </p:nvSpPr>
+        <p:spPr>
+          <a:xfrm>
+            <a:off x="8254679" y="4940830"/>
+            <a:ext cx="3368233" cy="1182032"/>
+          </a:xfrm>
+          <a:prstGeom prst="borderCallout1">
+            <a:avLst>
+              <a:gd name="adj1" fmla="val 39314"/>
+              <a:gd name="adj2" fmla="val 1289"/>
+              <a:gd name="adj3" fmla="val -37321"/>
+              <a:gd name="adj4" fmla="val -88505"/>
+            </a:avLst>
+          </a:prstGeom>
+          <a:solidFill>
+            <a:schemeClr val="accent1">
+              <a:lumMod val="20000"/>
+              <a:lumOff val="80000"/>
+            </a:schemeClr>
+          </a:solidFill>
+        </p:spPr>
+        <p:style>
+          <a:lnRef idx="2">
+            <a:schemeClr val="dk1"/>
+          </a:lnRef>
+          <a:fillRef idx="1">
+            <a:schemeClr val="lt1"/>
+          </a:fillRef>
+          <a:effectRef idx="0">
+            <a:schemeClr val="dk1"/>
+          </a:effectRef>
+          <a:fontRef idx="minor">
+            <a:schemeClr val="dk1"/>
+          </a:fontRef>
+        </p:style>
+        <p:txBody>
+          <a:bodyPr rtlCol="0" anchor="ctr"/>
+          <a:lstStyle/>
+          <a:p>
+            <a:pPr algn="ctr"/>
+            <a:r>
+              <a:rPr lang="en-US" dirty="0"/>
+              <a:t>The variable created here has a different namespace</a:t>
+            </a:r>
+          </a:p>
+        </p:txBody>
+      </p:sp>
+      <p:sp>
+        <p:nvSpPr>
+          <p:cNvPr id="8" name="Title 1">
+            <a:extLst>
+              <a:ext uri="{FF2B5EF4-FFF2-40B4-BE49-F238E27FC236}">
+                <a16:creationId xmlns:a16="http://schemas.microsoft.com/office/drawing/2014/main" id="{1C72843B-AC5B-4040-AADB-33CBDB0992D0}"/>
+              </a:ext>
+            </a:extLst>
+          </p:cNvPr>
+          <p:cNvSpPr>
+            <a:spLocks noGrp="1"/>
+          </p:cNvSpPr>
+          <p:nvPr>
+            <p:ph type="title"/>
+          </p:nvPr>
+        </p:nvSpPr>
+        <p:spPr>
+          <a:xfrm>
+            <a:off x="838200" y="365125"/>
+            <a:ext cx="10515600" cy="1325563"/>
+          </a:xfrm>
+        </p:spPr>
+        <p:txBody>
+          <a:bodyPr/>
+          <a:lstStyle/>
+          <a:p>
+            <a:r>
+              <a:rPr lang="en-US" dirty="0"/>
+              <a:t>Mostly solved by racket syntax</a:t>
+            </a:r>
+          </a:p>
+        </p:txBody>
+      </p:sp>
+      <p:sp>
+        <p:nvSpPr>
+          <p:cNvPr id="9" name="Callout: Line 8">
+            <a:extLst>
+              <a:ext uri="{FF2B5EF4-FFF2-40B4-BE49-F238E27FC236}">
+                <a16:creationId xmlns:a16="http://schemas.microsoft.com/office/drawing/2014/main" id="{D043020A-8D56-45B2-A8A3-4036875AD7E0}"/>
+              </a:ext>
+            </a:extLst>
+          </p:cNvPr>
+          <p:cNvSpPr/>
+          <p:nvPr/>
+        </p:nvSpPr>
+        <p:spPr>
+          <a:xfrm>
+            <a:off x="1103452" y="5683822"/>
+            <a:ext cx="3368233" cy="1182032"/>
+          </a:xfrm>
+          <a:prstGeom prst="borderCallout1">
+            <a:avLst>
+              <a:gd name="adj1" fmla="val -1401"/>
+              <a:gd name="adj2" fmla="val 40225"/>
+              <a:gd name="adj3" fmla="val -22053"/>
+              <a:gd name="adj4" fmla="val 75810"/>
+            </a:avLst>
+          </a:prstGeom>
+          <a:solidFill>
+            <a:schemeClr val="accent1">
+              <a:lumMod val="20000"/>
+              <a:lumOff val="80000"/>
+            </a:schemeClr>
+          </a:solidFill>
+        </p:spPr>
+        <p:style>
+          <a:lnRef idx="2">
+            <a:schemeClr val="dk1"/>
+          </a:lnRef>
+          <a:fillRef idx="1">
+            <a:schemeClr val="lt1"/>
+          </a:fillRef>
+          <a:effectRef idx="0">
+            <a:schemeClr val="dk1"/>
+          </a:effectRef>
+          <a:fontRef idx="minor">
+            <a:schemeClr val="dk1"/>
+          </a:fontRef>
+        </p:style>
+        <p:txBody>
+          <a:bodyPr rtlCol="0" anchor="ctr"/>
+          <a:lstStyle/>
+          <a:p>
+            <a:pPr algn="ctr"/>
+            <a:r>
+              <a:rPr lang="en-US" dirty="0"/>
+              <a:t>Variables referenced within the macro use the macro’s </a:t>
+            </a:r>
+            <a:r>
+              <a:rPr lang="en-US" dirty="0" err="1"/>
+              <a:t>namspace</a:t>
+            </a:r>
+            <a:endParaRPr lang="en-US" dirty="0"/>
+          </a:p>
+        </p:txBody>
+      </p:sp>
+    </p:spTree>
+    <p:extLst>
+      <p:ext uri="{BB962C8B-B14F-4D97-AF65-F5344CB8AC3E}">
+        <p14:creationId xmlns:p14="http://schemas.microsoft.com/office/powerpoint/2010/main" val="898275119"/>
+      </p:ext>
+    </p:extLst>
+  </p:cSld>
+  <p:clrMapOvr>
+    <a:masterClrMapping/>
+  </p:clrMapOvr>
+</p:sld>
+</file>
+
+<file path=ppt/slides/slide12.xml><?xml version="1.0" encoding="utf-8"?>
 <p:sld xmlns:a="http://schemas.openxmlformats.org/drawingml/2006/main" xmlns:r="http://schemas.openxmlformats.org/officeDocument/2006/relationships" xmlns:p="http://schemas.openxmlformats.org/presentationml/2006/main">
   <p:cSld>
     <p:spTree>
@@ -4554,7 +5678,7 @@
 </p:sld>
 </file>
 
-<file path=ppt/slides/slide11.xml><?xml version="1.0" encoding="utf-8"?>
+<file path=ppt/slides/slide13.xml><?xml version="1.0" encoding="utf-8"?>
 <p:sld xmlns:a="http://schemas.openxmlformats.org/drawingml/2006/main" xmlns:r="http://schemas.openxmlformats.org/officeDocument/2006/relationships" xmlns:p="http://schemas.openxmlformats.org/presentationml/2006/main">
   <p:cSld>
     <p:spTree>
@@ -4839,13 +5963,13 @@
           <a:p>
             <a:r>
               <a:rPr lang="en-US" dirty="0"/>
+              <a:t>Recursive macros &amp; practice</a:t>
+            </a:r>
+          </a:p>
+          <a:p>
+            <a:r>
+              <a:rPr lang="en-US" dirty="0"/>
               <a:t>Variable capture – a common issue with macros that you should be aware of and how racket macros avoid it mostly</a:t>
-            </a:r>
-          </a:p>
-          <a:p>
-            <a:r>
-              <a:rPr lang="en-US" dirty="0"/>
-              <a:t>How to do more complex calculations in the macro expansion phase</a:t>
             </a:r>
           </a:p>
         </p:txBody>
@@ -4885,343 +6009,6 @@
           <p:cNvPr id="2" name="Title 1">
             <a:extLst>
               <a:ext uri="{FF2B5EF4-FFF2-40B4-BE49-F238E27FC236}">
-                <a16:creationId xmlns:a16="http://schemas.microsoft.com/office/drawing/2014/main" id="{DC1A6D24-D371-45ED-AD5D-B77280709DE1}"/>
-              </a:ext>
-            </a:extLst>
-          </p:cNvPr>
-          <p:cNvSpPr>
-            <a:spLocks noGrp="1"/>
-          </p:cNvSpPr>
-          <p:nvPr>
-            <p:ph type="title"/>
-          </p:nvPr>
-        </p:nvSpPr>
-        <p:spPr/>
-        <p:txBody>
-          <a:bodyPr/>
-          <a:lstStyle/>
-          <a:p>
-            <a:r>
-              <a:rPr lang="en-US" dirty="0"/>
-              <a:t>Macro templates are good but have limits</a:t>
-            </a:r>
-          </a:p>
-        </p:txBody>
-      </p:sp>
-      <p:sp>
-        <p:nvSpPr>
-          <p:cNvPr id="4" name="Rectangle 3">
-            <a:extLst>
-              <a:ext uri="{FF2B5EF4-FFF2-40B4-BE49-F238E27FC236}">
-                <a16:creationId xmlns:a16="http://schemas.microsoft.com/office/drawing/2014/main" id="{63207CD5-4E34-42E3-A2B6-23CA51269998}"/>
-              </a:ext>
-            </a:extLst>
-          </p:cNvPr>
-          <p:cNvSpPr/>
-          <p:nvPr/>
-        </p:nvSpPr>
-        <p:spPr>
-          <a:xfrm>
-            <a:off x="177477" y="1690688"/>
-            <a:ext cx="11825469" cy="2585323"/>
-          </a:xfrm>
-          <a:prstGeom prst="rect">
-            <a:avLst/>
-          </a:prstGeom>
-        </p:spPr>
-        <p:txBody>
-          <a:bodyPr wrap="square">
-            <a:spAutoFit/>
-          </a:bodyPr>
-          <a:lstStyle/>
-          <a:p>
-            <a:r>
-              <a:rPr lang="en-US" dirty="0">
-                <a:latin typeface="Consolas" panose="020B0609020204030204" pitchFamily="49" charset="0"/>
-              </a:rPr>
-              <a:t>(define-syntax </a:t>
-            </a:r>
-            <a:r>
-              <a:rPr lang="en-US" dirty="0" err="1">
-                <a:latin typeface="Consolas" panose="020B0609020204030204" pitchFamily="49" charset="0"/>
-              </a:rPr>
-              <a:t>numed-syms</a:t>
-            </a:r>
-            <a:endParaRPr lang="en-US" dirty="0">
-              <a:latin typeface="Consolas" panose="020B0609020204030204" pitchFamily="49" charset="0"/>
-            </a:endParaRPr>
-          </a:p>
-          <a:p>
-            <a:r>
-              <a:rPr lang="en-US" dirty="0">
-                <a:latin typeface="Consolas" panose="020B0609020204030204" pitchFamily="49" charset="0"/>
-              </a:rPr>
-              <a:t>  (lambda (</a:t>
-            </a:r>
-            <a:r>
-              <a:rPr lang="en-US" dirty="0" err="1">
-                <a:latin typeface="Consolas" panose="020B0609020204030204" pitchFamily="49" charset="0"/>
-              </a:rPr>
-              <a:t>stx</a:t>
-            </a:r>
-            <a:r>
-              <a:rPr lang="en-US" dirty="0">
-                <a:latin typeface="Consolas" panose="020B0609020204030204" pitchFamily="49" charset="0"/>
-              </a:rPr>
-              <a:t>)</a:t>
-            </a:r>
-          </a:p>
-          <a:p>
-            <a:r>
-              <a:rPr lang="en-US" dirty="0">
-                <a:latin typeface="Consolas" panose="020B0609020204030204" pitchFamily="49" charset="0"/>
-              </a:rPr>
-              <a:t>    (datum-&gt;syntax </a:t>
-            </a:r>
-            <a:r>
-              <a:rPr lang="en-US" dirty="0" err="1">
-                <a:latin typeface="Consolas" panose="020B0609020204030204" pitchFamily="49" charset="0"/>
-              </a:rPr>
-              <a:t>stx</a:t>
-            </a:r>
-            <a:endParaRPr lang="en-US" dirty="0">
-              <a:latin typeface="Consolas" panose="020B0609020204030204" pitchFamily="49" charset="0"/>
-            </a:endParaRPr>
-          </a:p>
-          <a:p>
-            <a:r>
-              <a:rPr lang="en-US" dirty="0">
-                <a:latin typeface="Consolas" panose="020B0609020204030204" pitchFamily="49" charset="0"/>
-              </a:rPr>
-              <a:t>                   (list 'quote (let recur ([num 0]</a:t>
-            </a:r>
-          </a:p>
-          <a:p>
-            <a:r>
-              <a:rPr lang="en-US" dirty="0">
-                <a:latin typeface="Consolas" panose="020B0609020204030204" pitchFamily="49" charset="0"/>
-              </a:rPr>
-              <a:t>                                            [</a:t>
-            </a:r>
-            <a:r>
-              <a:rPr lang="en-US" dirty="0" err="1">
-                <a:latin typeface="Consolas" panose="020B0609020204030204" pitchFamily="49" charset="0"/>
-              </a:rPr>
-              <a:t>syms</a:t>
-            </a:r>
-            <a:r>
-              <a:rPr lang="en-US" dirty="0">
-                <a:latin typeface="Consolas" panose="020B0609020204030204" pitchFamily="49" charset="0"/>
-              </a:rPr>
-              <a:t> (</a:t>
-            </a:r>
-            <a:r>
-              <a:rPr lang="en-US" dirty="0" err="1">
-                <a:latin typeface="Consolas" panose="020B0609020204030204" pitchFamily="49" charset="0"/>
-              </a:rPr>
-              <a:t>cdr</a:t>
-            </a:r>
-            <a:r>
-              <a:rPr lang="en-US" dirty="0">
-                <a:latin typeface="Consolas" panose="020B0609020204030204" pitchFamily="49" charset="0"/>
-              </a:rPr>
-              <a:t> (syntax-&gt;datum </a:t>
-            </a:r>
-            <a:r>
-              <a:rPr lang="en-US" dirty="0" err="1">
-                <a:latin typeface="Consolas" panose="020B0609020204030204" pitchFamily="49" charset="0"/>
-              </a:rPr>
-              <a:t>stx</a:t>
-            </a:r>
-            <a:r>
-              <a:rPr lang="en-US" dirty="0">
-                <a:latin typeface="Consolas" panose="020B0609020204030204" pitchFamily="49" charset="0"/>
-              </a:rPr>
-              <a:t>))])</a:t>
-            </a:r>
-          </a:p>
-          <a:p>
-            <a:r>
-              <a:rPr lang="en-US" dirty="0">
-                <a:latin typeface="Consolas" panose="020B0609020204030204" pitchFamily="49" charset="0"/>
-              </a:rPr>
-              <a:t>                                      (if (null? </a:t>
-            </a:r>
-            <a:r>
-              <a:rPr lang="en-US" dirty="0" err="1">
-                <a:latin typeface="Consolas" panose="020B0609020204030204" pitchFamily="49" charset="0"/>
-              </a:rPr>
-              <a:t>syms</a:t>
-            </a:r>
-            <a:r>
-              <a:rPr lang="en-US" dirty="0">
-                <a:latin typeface="Consolas" panose="020B0609020204030204" pitchFamily="49" charset="0"/>
-              </a:rPr>
-              <a:t>)</a:t>
-            </a:r>
-          </a:p>
-          <a:p>
-            <a:r>
-              <a:rPr lang="en-US" dirty="0">
-                <a:latin typeface="Consolas" panose="020B0609020204030204" pitchFamily="49" charset="0"/>
-              </a:rPr>
-              <a:t>                                          '()</a:t>
-            </a:r>
-          </a:p>
-          <a:p>
-            <a:r>
-              <a:rPr lang="en-US" dirty="0">
-                <a:latin typeface="Consolas" panose="020B0609020204030204" pitchFamily="49" charset="0"/>
-              </a:rPr>
-              <a:t>                                          (cons (cons (car </a:t>
-            </a:r>
-            <a:r>
-              <a:rPr lang="en-US" dirty="0" err="1">
-                <a:latin typeface="Consolas" panose="020B0609020204030204" pitchFamily="49" charset="0"/>
-              </a:rPr>
-              <a:t>syms</a:t>
-            </a:r>
-            <a:r>
-              <a:rPr lang="en-US" dirty="0">
-                <a:latin typeface="Consolas" panose="020B0609020204030204" pitchFamily="49" charset="0"/>
-              </a:rPr>
-              <a:t>) num)</a:t>
-            </a:r>
-          </a:p>
-          <a:p>
-            <a:r>
-              <a:rPr lang="en-US" dirty="0">
-                <a:latin typeface="Consolas" panose="020B0609020204030204" pitchFamily="49" charset="0"/>
-              </a:rPr>
-              <a:t>                                                (recur (add1 num) (</a:t>
-            </a:r>
-            <a:r>
-              <a:rPr lang="en-US" dirty="0" err="1">
-                <a:latin typeface="Consolas" panose="020B0609020204030204" pitchFamily="49" charset="0"/>
-              </a:rPr>
-              <a:t>cdr</a:t>
-            </a:r>
-            <a:r>
-              <a:rPr lang="en-US" dirty="0">
-                <a:latin typeface="Consolas" panose="020B0609020204030204" pitchFamily="49" charset="0"/>
-              </a:rPr>
-              <a:t> </a:t>
-            </a:r>
-            <a:r>
-              <a:rPr lang="en-US" dirty="0" err="1">
-                <a:latin typeface="Consolas" panose="020B0609020204030204" pitchFamily="49" charset="0"/>
-              </a:rPr>
-              <a:t>syms</a:t>
-            </a:r>
-            <a:r>
-              <a:rPr lang="en-US" dirty="0">
-                <a:latin typeface="Consolas" panose="020B0609020204030204" pitchFamily="49" charset="0"/>
-              </a:rPr>
-              <a:t>)))))))))</a:t>
-            </a:r>
-          </a:p>
-        </p:txBody>
-      </p:sp>
-      <p:pic>
-        <p:nvPicPr>
-          <p:cNvPr id="3" name="Picture 2">
-            <a:extLst>
-              <a:ext uri="{FF2B5EF4-FFF2-40B4-BE49-F238E27FC236}">
-                <a16:creationId xmlns:a16="http://schemas.microsoft.com/office/drawing/2014/main" id="{CF71ACAB-4939-4DF9-ADC1-0D0B21C1F7B1}"/>
-              </a:ext>
-            </a:extLst>
-          </p:cNvPr>
-          <p:cNvPicPr>
-            <a:picLocks noChangeAspect="1"/>
-          </p:cNvPicPr>
-          <p:nvPr/>
-        </p:nvPicPr>
-        <p:blipFill>
-          <a:blip r:embed="rId2"/>
-          <a:stretch>
-            <a:fillRect/>
-          </a:stretch>
-        </p:blipFill>
-        <p:spPr>
-          <a:xfrm>
-            <a:off x="519089" y="4643364"/>
-            <a:ext cx="4648849" cy="523948"/>
-          </a:xfrm>
-          <a:prstGeom prst="rect">
-            <a:avLst/>
-          </a:prstGeom>
-        </p:spPr>
-      </p:pic>
-      <p:sp>
-        <p:nvSpPr>
-          <p:cNvPr id="5" name="TextBox 4">
-            <a:extLst>
-              <a:ext uri="{FF2B5EF4-FFF2-40B4-BE49-F238E27FC236}">
-                <a16:creationId xmlns:a16="http://schemas.microsoft.com/office/drawing/2014/main" id="{41A635F0-CF50-4D32-95EA-EF00A77E052D}"/>
-              </a:ext>
-            </a:extLst>
-          </p:cNvPr>
-          <p:cNvSpPr txBox="1"/>
-          <p:nvPr/>
-        </p:nvSpPr>
-        <p:spPr>
-          <a:xfrm>
-            <a:off x="1493134" y="6007261"/>
-            <a:ext cx="6812249" cy="461665"/>
-          </a:xfrm>
-          <a:prstGeom prst="rect">
-            <a:avLst/>
-          </a:prstGeom>
-          <a:noFill/>
-        </p:spPr>
-        <p:txBody>
-          <a:bodyPr wrap="none" rtlCol="0">
-            <a:spAutoFit/>
-          </a:bodyPr>
-          <a:lstStyle/>
-          <a:p>
-            <a:r>
-              <a:rPr lang="en-US" sz="2400" dirty="0"/>
-              <a:t>By treating code as fully data, we get plenty of power</a:t>
-            </a:r>
-          </a:p>
-        </p:txBody>
-      </p:sp>
-    </p:spTree>
-    <p:extLst>
-      <p:ext uri="{BB962C8B-B14F-4D97-AF65-F5344CB8AC3E}">
-        <p14:creationId xmlns:p14="http://schemas.microsoft.com/office/powerpoint/2010/main" val="3888160088"/>
-      </p:ext>
-    </p:extLst>
-  </p:cSld>
-  <p:clrMapOvr>
-    <a:masterClrMapping/>
-  </p:clrMapOvr>
-</p:sld>
-</file>
-
-<file path=ppt/slides/slide4.xml><?xml version="1.0" encoding="utf-8"?>
-<p:sld xmlns:a="http://schemas.openxmlformats.org/drawingml/2006/main" xmlns:r="http://schemas.openxmlformats.org/officeDocument/2006/relationships" xmlns:p="http://schemas.openxmlformats.org/presentationml/2006/main">
-  <p:cSld>
-    <p:spTree>
-      <p:nvGrpSpPr>
-        <p:cNvPr id="1" name=""/>
-        <p:cNvGrpSpPr/>
-        <p:nvPr/>
-      </p:nvGrpSpPr>
-      <p:grpSpPr>
-        <a:xfrm>
-          <a:off x="0" y="0"/>
-          <a:ext cx="0" cy="0"/>
-          <a:chOff x="0" y="0"/>
-          <a:chExt cx="0" cy="0"/>
-        </a:xfrm>
-      </p:grpSpPr>
-      <p:sp>
-        <p:nvSpPr>
-          <p:cNvPr id="2" name="Title 1">
-            <a:extLst>
-              <a:ext uri="{FF2B5EF4-FFF2-40B4-BE49-F238E27FC236}">
                 <a16:creationId xmlns:a16="http://schemas.microsoft.com/office/drawing/2014/main" id="{C64977BE-A58F-4BF8-BB35-E57044B12E2E}"/>
               </a:ext>
             </a:extLst>
@@ -5430,6 +6217,114 @@
     <p:extLst>
       <p:ext uri="{BB962C8B-B14F-4D97-AF65-F5344CB8AC3E}">
         <p14:creationId xmlns:p14="http://schemas.microsoft.com/office/powerpoint/2010/main" val="332350083"/>
+      </p:ext>
+    </p:extLst>
+  </p:cSld>
+  <p:clrMapOvr>
+    <a:masterClrMapping/>
+  </p:clrMapOvr>
+</p:sld>
+</file>
+
+<file path=ppt/slides/slide4.xml><?xml version="1.0" encoding="utf-8"?>
+<p:sld xmlns:a="http://schemas.openxmlformats.org/drawingml/2006/main" xmlns:r="http://schemas.openxmlformats.org/officeDocument/2006/relationships" xmlns:p="http://schemas.openxmlformats.org/presentationml/2006/main">
+  <p:cSld>
+    <p:spTree>
+      <p:nvGrpSpPr>
+        <p:cNvPr id="1" name=""/>
+        <p:cNvGrpSpPr/>
+        <p:nvPr/>
+      </p:nvGrpSpPr>
+      <p:grpSpPr>
+        <a:xfrm>
+          <a:off x="0" y="0"/>
+          <a:ext cx="0" cy="0"/>
+          <a:chOff x="0" y="0"/>
+          <a:chExt cx="0" cy="0"/>
+        </a:xfrm>
+      </p:grpSpPr>
+      <p:sp>
+        <p:nvSpPr>
+          <p:cNvPr id="2" name="Title 1">
+            <a:extLst>
+              <a:ext uri="{FF2B5EF4-FFF2-40B4-BE49-F238E27FC236}">
+                <a16:creationId xmlns:a16="http://schemas.microsoft.com/office/drawing/2014/main" id="{10E381F0-7B6C-00E6-63B4-1C1847866AB1}"/>
+              </a:ext>
+            </a:extLst>
+          </p:cNvPr>
+          <p:cNvSpPr>
+            <a:spLocks noGrp="1"/>
+          </p:cNvSpPr>
+          <p:nvPr>
+            <p:ph type="title"/>
+          </p:nvPr>
+        </p:nvSpPr>
+        <p:spPr/>
+        <p:txBody>
+          <a:bodyPr/>
+          <a:lstStyle/>
+          <a:p>
+            <a:r>
+              <a:rPr lang="en-US" dirty="0"/>
+              <a:t>Coding</a:t>
+            </a:r>
+          </a:p>
+        </p:txBody>
+      </p:sp>
+      <p:sp>
+        <p:nvSpPr>
+          <p:cNvPr id="3" name="Content Placeholder 2">
+            <a:extLst>
+              <a:ext uri="{FF2B5EF4-FFF2-40B4-BE49-F238E27FC236}">
+                <a16:creationId xmlns:a16="http://schemas.microsoft.com/office/drawing/2014/main" id="{2B3B7CB7-3281-A2DF-6A78-46BE70EE6C1E}"/>
+              </a:ext>
+            </a:extLst>
+          </p:cNvPr>
+          <p:cNvSpPr>
+            <a:spLocks noGrp="1"/>
+          </p:cNvSpPr>
+          <p:nvPr>
+            <p:ph idx="1"/>
+          </p:nvPr>
+        </p:nvSpPr>
+        <p:spPr/>
+        <p:txBody>
+          <a:bodyPr/>
+          <a:lstStyle/>
+          <a:p>
+            <a:r>
+              <a:rPr lang="en-US" dirty="0"/>
+              <a:t>We’ll solve </a:t>
+            </a:r>
+            <a:r>
+              <a:rPr lang="en-US" dirty="0" err="1"/>
+              <a:t>myand</a:t>
+            </a:r>
+            <a:r>
+              <a:rPr lang="en-US" dirty="0"/>
+              <a:t> together</a:t>
+            </a:r>
+          </a:p>
+          <a:p>
+            <a:r>
+              <a:rPr lang="en-US" dirty="0"/>
+              <a:t>You’ll do </a:t>
+            </a:r>
+            <a:r>
+              <a:rPr lang="en-US" dirty="0" err="1"/>
+              <a:t>mylet</a:t>
+            </a:r>
+            <a:r>
+              <a:rPr lang="en-US" dirty="0"/>
+              <a:t>* individually</a:t>
+            </a:r>
+          </a:p>
+        </p:txBody>
+      </p:sp>
+    </p:spTree>
+    <p:extLst>
+      <p:ext uri="{BB962C8B-B14F-4D97-AF65-F5344CB8AC3E}">
+        <p14:creationId xmlns:p14="http://schemas.microsoft.com/office/powerpoint/2010/main" val="1157684767"/>
       </p:ext>
     </p:extLst>
   </p:cSld>
@@ -5913,7 +6808,7 @@
           <p:cNvPr id="2" name="Title 1">
             <a:extLst>
               <a:ext uri="{FF2B5EF4-FFF2-40B4-BE49-F238E27FC236}">
-                <a16:creationId xmlns:a16="http://schemas.microsoft.com/office/drawing/2014/main" id="{75F3D548-3E64-4CD6-BBE2-E8AB594A3236}"/>
+                <a16:creationId xmlns:a16="http://schemas.microsoft.com/office/drawing/2014/main" id="{79C5FA93-88DB-27AC-FBFE-A03778177007}"/>
               </a:ext>
             </a:extLst>
           </p:cNvPr>
@@ -5924,20 +6819,20 @@
             <p:ph type="title"/>
           </p:nvPr>
         </p:nvSpPr>
-        <p:spPr>
-          <a:xfrm>
-            <a:off x="838200" y="249379"/>
-            <a:ext cx="10515600" cy="792343"/>
-          </a:xfrm>
-        </p:spPr>
+        <p:spPr/>
         <p:txBody>
           <a:bodyPr/>
           <a:lstStyle/>
           <a:p>
             <a:r>
               <a:rPr lang="en-US" dirty="0"/>
-              <a:t>Variable Capture Problems</a:t>
-            </a:r>
+              <a:t>Ok now try </a:t>
+            </a:r>
+            <a:r>
+              <a:rPr lang="en-US" dirty="0" err="1"/>
+              <a:t>listlet</a:t>
+            </a:r>
+            <a:endParaRPr lang="en-US" dirty="0"/>
           </a:p>
         </p:txBody>
       </p:sp>
@@ -5946,7 +6841,7 @@
           <p:cNvPr id="3" name="Content Placeholder 2">
             <a:extLst>
               <a:ext uri="{FF2B5EF4-FFF2-40B4-BE49-F238E27FC236}">
-                <a16:creationId xmlns:a16="http://schemas.microsoft.com/office/drawing/2014/main" id="{84391CD8-05AB-4B2E-BD40-A2E3D48D0286}"/>
+                <a16:creationId xmlns:a16="http://schemas.microsoft.com/office/drawing/2014/main" id="{F909F847-7CB3-F8DE-EA41-A4D4CFF2967C}"/>
               </a:ext>
             </a:extLst>
           </p:cNvPr>
@@ -5957,365 +6852,14 @@
             <p:ph idx="1"/>
           </p:nvPr>
         </p:nvSpPr>
-        <p:spPr>
-          <a:xfrm>
-            <a:off x="838200" y="1157468"/>
-            <a:ext cx="10515600" cy="5602147"/>
-          </a:xfrm>
-        </p:spPr>
-        <p:txBody>
-          <a:bodyPr>
-            <a:normAutofit/>
-          </a:bodyPr>
-          <a:lstStyle/>
-          <a:p>
-            <a:pPr marL="0" indent="0">
-              <a:buNone/>
-            </a:pPr>
-            <a:r>
-              <a:rPr lang="en-US" sz="1600" dirty="0">
-                <a:latin typeface="Consolas" panose="020B0609020204030204" pitchFamily="49" charset="0"/>
-              </a:rPr>
-              <a:t>(define-syntax </a:t>
-            </a:r>
-            <a:r>
-              <a:rPr lang="en-US" sz="1600" dirty="0" err="1">
-                <a:latin typeface="Consolas" panose="020B0609020204030204" pitchFamily="49" charset="0"/>
-              </a:rPr>
-              <a:t>badswap</a:t>
-            </a:r>
-            <a:endParaRPr lang="en-US" sz="1600" dirty="0">
-              <a:latin typeface="Consolas" panose="020B0609020204030204" pitchFamily="49" charset="0"/>
-            </a:endParaRPr>
-          </a:p>
-          <a:p>
-            <a:pPr marL="0" indent="0">
-              <a:buNone/>
-            </a:pPr>
-            <a:r>
-              <a:rPr lang="en-US" sz="1600" dirty="0">
-                <a:latin typeface="Consolas" panose="020B0609020204030204" pitchFamily="49" charset="0"/>
-              </a:rPr>
-              <a:t>  (lambda (</a:t>
-            </a:r>
-            <a:r>
-              <a:rPr lang="en-US" sz="1600" dirty="0" err="1">
-                <a:latin typeface="Consolas" panose="020B0609020204030204" pitchFamily="49" charset="0"/>
-              </a:rPr>
-              <a:t>stx</a:t>
-            </a:r>
-            <a:r>
-              <a:rPr lang="en-US" sz="1600" dirty="0">
-                <a:latin typeface="Consolas" panose="020B0609020204030204" pitchFamily="49" charset="0"/>
-              </a:rPr>
-              <a:t>)</a:t>
-            </a:r>
-          </a:p>
-          <a:p>
-            <a:pPr marL="0" indent="0">
-              <a:buNone/>
-            </a:pPr>
-            <a:r>
-              <a:rPr lang="en-US" sz="1600" dirty="0">
-                <a:latin typeface="Consolas" panose="020B0609020204030204" pitchFamily="49" charset="0"/>
-              </a:rPr>
-              <a:t>    (datum-&gt;syntax </a:t>
-            </a:r>
-            <a:r>
-              <a:rPr lang="en-US" sz="1600" dirty="0" err="1">
-                <a:latin typeface="Consolas" panose="020B0609020204030204" pitchFamily="49" charset="0"/>
-              </a:rPr>
-              <a:t>stx</a:t>
-            </a:r>
-            <a:r>
-              <a:rPr lang="en-US" sz="1600" dirty="0">
-                <a:latin typeface="Consolas" panose="020B0609020204030204" pitchFamily="49" charset="0"/>
-              </a:rPr>
-              <a:t> (let* ([</a:t>
-            </a:r>
-            <a:r>
-              <a:rPr lang="en-US" sz="1600" dirty="0" err="1">
-                <a:latin typeface="Consolas" panose="020B0609020204030204" pitchFamily="49" charset="0"/>
-              </a:rPr>
-              <a:t>orig</a:t>
-            </a:r>
-            <a:r>
-              <a:rPr lang="en-US" sz="1600" dirty="0">
-                <a:latin typeface="Consolas" panose="020B0609020204030204" pitchFamily="49" charset="0"/>
-              </a:rPr>
-              <a:t> (syntax-&gt;datum </a:t>
-            </a:r>
-            <a:r>
-              <a:rPr lang="en-US" sz="1600" dirty="0" err="1">
-                <a:latin typeface="Consolas" panose="020B0609020204030204" pitchFamily="49" charset="0"/>
-              </a:rPr>
-              <a:t>stx</a:t>
-            </a:r>
-            <a:r>
-              <a:rPr lang="en-US" sz="1600" dirty="0">
-                <a:latin typeface="Consolas" panose="020B0609020204030204" pitchFamily="49" charset="0"/>
-              </a:rPr>
-              <a:t>)]</a:t>
-            </a:r>
-          </a:p>
-          <a:p>
-            <a:pPr marL="0" indent="0">
-              <a:buNone/>
-            </a:pPr>
-            <a:r>
-              <a:rPr lang="en-US" sz="1600" dirty="0">
-                <a:latin typeface="Consolas" panose="020B0609020204030204" pitchFamily="49" charset="0"/>
-              </a:rPr>
-              <a:t>                              [v1 (</a:t>
-            </a:r>
-            <a:r>
-              <a:rPr lang="en-US" sz="1600" dirty="0" err="1">
-                <a:latin typeface="Consolas" panose="020B0609020204030204" pitchFamily="49" charset="0"/>
-              </a:rPr>
-              <a:t>cadr</a:t>
-            </a:r>
-            <a:r>
-              <a:rPr lang="en-US" sz="1600" dirty="0">
-                <a:latin typeface="Consolas" panose="020B0609020204030204" pitchFamily="49" charset="0"/>
-              </a:rPr>
-              <a:t> </a:t>
-            </a:r>
-            <a:r>
-              <a:rPr lang="en-US" sz="1600" dirty="0" err="1">
-                <a:latin typeface="Consolas" panose="020B0609020204030204" pitchFamily="49" charset="0"/>
-              </a:rPr>
-              <a:t>orig</a:t>
-            </a:r>
-            <a:r>
-              <a:rPr lang="en-US" sz="1600" dirty="0">
-                <a:latin typeface="Consolas" panose="020B0609020204030204" pitchFamily="49" charset="0"/>
-              </a:rPr>
-              <a:t>)]</a:t>
-            </a:r>
-          </a:p>
-          <a:p>
-            <a:pPr marL="0" indent="0">
-              <a:buNone/>
-            </a:pPr>
-            <a:r>
-              <a:rPr lang="en-US" sz="1600" dirty="0">
-                <a:latin typeface="Consolas" panose="020B0609020204030204" pitchFamily="49" charset="0"/>
-              </a:rPr>
-              <a:t>                              [v2 (</a:t>
-            </a:r>
-            <a:r>
-              <a:rPr lang="en-US" sz="1600" dirty="0" err="1">
-                <a:latin typeface="Consolas" panose="020B0609020204030204" pitchFamily="49" charset="0"/>
-              </a:rPr>
-              <a:t>caddr</a:t>
-            </a:r>
-            <a:r>
-              <a:rPr lang="en-US" sz="1600" dirty="0">
-                <a:latin typeface="Consolas" panose="020B0609020204030204" pitchFamily="49" charset="0"/>
-              </a:rPr>
-              <a:t> </a:t>
-            </a:r>
-            <a:r>
-              <a:rPr lang="en-US" sz="1600" dirty="0" err="1">
-                <a:latin typeface="Consolas" panose="020B0609020204030204" pitchFamily="49" charset="0"/>
-              </a:rPr>
-              <a:t>orig</a:t>
-            </a:r>
-            <a:r>
-              <a:rPr lang="en-US" sz="1600" dirty="0">
-                <a:latin typeface="Consolas" panose="020B0609020204030204" pitchFamily="49" charset="0"/>
-              </a:rPr>
-              <a:t>)])</a:t>
-            </a:r>
-          </a:p>
-          <a:p>
-            <a:pPr marL="0" indent="0">
-              <a:buNone/>
-            </a:pPr>
-            <a:r>
-              <a:rPr lang="en-US" sz="1600" dirty="0">
-                <a:latin typeface="Consolas" panose="020B0609020204030204" pitchFamily="49" charset="0"/>
-              </a:rPr>
-              <a:t>                         (list 'let (list (list '</a:t>
-            </a:r>
-            <a:r>
-              <a:rPr lang="en-US" sz="1600" dirty="0" err="1">
-                <a:latin typeface="Consolas" panose="020B0609020204030204" pitchFamily="49" charset="0"/>
-              </a:rPr>
-              <a:t>tmp</a:t>
-            </a:r>
-            <a:r>
-              <a:rPr lang="en-US" sz="1600" dirty="0">
-                <a:latin typeface="Consolas" panose="020B0609020204030204" pitchFamily="49" charset="0"/>
-              </a:rPr>
-              <a:t> v1))</a:t>
-            </a:r>
-          </a:p>
-          <a:p>
-            <a:pPr marL="0" indent="0">
-              <a:buNone/>
-            </a:pPr>
-            <a:r>
-              <a:rPr lang="en-US" sz="1600" dirty="0">
-                <a:latin typeface="Consolas" panose="020B0609020204030204" pitchFamily="49" charset="0"/>
-              </a:rPr>
-              <a:t>                               (list 'set! v1 v2)</a:t>
-            </a:r>
-          </a:p>
-          <a:p>
-            <a:pPr marL="0" indent="0">
-              <a:buNone/>
-            </a:pPr>
-            <a:r>
-              <a:rPr lang="en-US" sz="1600" dirty="0">
-                <a:latin typeface="Consolas" panose="020B0609020204030204" pitchFamily="49" charset="0"/>
-              </a:rPr>
-              <a:t>                               (list 'set! v2 '</a:t>
-            </a:r>
-            <a:r>
-              <a:rPr lang="en-US" sz="1600" dirty="0" err="1">
-                <a:latin typeface="Consolas" panose="020B0609020204030204" pitchFamily="49" charset="0"/>
-              </a:rPr>
-              <a:t>tmp</a:t>
-            </a:r>
-            <a:r>
-              <a:rPr lang="en-US" sz="1600" dirty="0">
-                <a:latin typeface="Consolas" panose="020B0609020204030204" pitchFamily="49" charset="0"/>
-              </a:rPr>
-              <a:t>))))))</a:t>
-            </a:r>
-          </a:p>
-          <a:p>
-            <a:pPr marL="0" indent="0">
-              <a:buNone/>
-            </a:pPr>
-            <a:r>
-              <a:rPr lang="en-US" sz="1600" dirty="0">
-                <a:latin typeface="Consolas" panose="020B0609020204030204" pitchFamily="49" charset="0"/>
-              </a:rPr>
-              <a:t>      </a:t>
-            </a:r>
-          </a:p>
-          <a:p>
-            <a:pPr marL="0" indent="0">
-              <a:buNone/>
-            </a:pPr>
-            <a:endParaRPr lang="en-US" sz="1600" dirty="0">
-              <a:latin typeface="Consolas" panose="020B0609020204030204" pitchFamily="49" charset="0"/>
-            </a:endParaRPr>
-          </a:p>
-          <a:p>
-            <a:pPr marL="0" indent="0">
-              <a:buNone/>
-            </a:pPr>
-            <a:r>
-              <a:rPr lang="en-US" sz="1600" dirty="0">
-                <a:latin typeface="Consolas" panose="020B0609020204030204" pitchFamily="49" charset="0"/>
-              </a:rPr>
-              <a:t>(define a 1)</a:t>
-            </a:r>
-          </a:p>
-          <a:p>
-            <a:pPr marL="0" indent="0">
-              <a:buNone/>
-            </a:pPr>
-            <a:r>
-              <a:rPr lang="en-US" sz="1600" dirty="0">
-                <a:latin typeface="Consolas" panose="020B0609020204030204" pitchFamily="49" charset="0"/>
-              </a:rPr>
-              <a:t>(define b 2)</a:t>
-            </a:r>
-          </a:p>
-          <a:p>
-            <a:pPr marL="0" indent="0">
-              <a:buNone/>
-            </a:pPr>
-            <a:r>
-              <a:rPr lang="en-US" sz="1600" dirty="0">
-                <a:latin typeface="Consolas" panose="020B0609020204030204" pitchFamily="49" charset="0"/>
-              </a:rPr>
-              <a:t>(</a:t>
-            </a:r>
-            <a:r>
-              <a:rPr lang="en-US" sz="1600" dirty="0" err="1">
-                <a:latin typeface="Consolas" panose="020B0609020204030204" pitchFamily="49" charset="0"/>
-              </a:rPr>
-              <a:t>badswap</a:t>
-            </a:r>
-            <a:r>
-              <a:rPr lang="en-US" sz="1600" dirty="0">
-                <a:latin typeface="Consolas" panose="020B0609020204030204" pitchFamily="49" charset="0"/>
-              </a:rPr>
-              <a:t> a b) ; works</a:t>
-            </a:r>
-          </a:p>
-          <a:p>
-            <a:pPr marL="0" indent="0">
-              <a:buNone/>
-            </a:pPr>
-            <a:r>
-              <a:rPr lang="en-US" sz="1600" dirty="0">
-                <a:latin typeface="Consolas" panose="020B0609020204030204" pitchFamily="49" charset="0"/>
-              </a:rPr>
-              <a:t>(define q 3)</a:t>
-            </a:r>
-          </a:p>
-          <a:p>
-            <a:pPr marL="0" indent="0">
-              <a:buNone/>
-            </a:pPr>
-            <a:r>
-              <a:rPr lang="en-US" sz="1600" dirty="0">
-                <a:latin typeface="Consolas" panose="020B0609020204030204" pitchFamily="49" charset="0"/>
-              </a:rPr>
-              <a:t>(define </a:t>
-            </a:r>
-            <a:r>
-              <a:rPr lang="en-US" sz="1600" dirty="0" err="1">
-                <a:latin typeface="Consolas" panose="020B0609020204030204" pitchFamily="49" charset="0"/>
-              </a:rPr>
-              <a:t>tmp</a:t>
-            </a:r>
-            <a:r>
-              <a:rPr lang="en-US" sz="1600" dirty="0">
-                <a:latin typeface="Consolas" panose="020B0609020204030204" pitchFamily="49" charset="0"/>
-              </a:rPr>
-              <a:t> 99)</a:t>
-            </a:r>
-          </a:p>
-          <a:p>
-            <a:pPr marL="0" indent="0">
-              <a:buNone/>
-            </a:pPr>
-            <a:r>
-              <a:rPr lang="en-US" sz="1600" dirty="0">
-                <a:latin typeface="Consolas" panose="020B0609020204030204" pitchFamily="49" charset="0"/>
-              </a:rPr>
-              <a:t>(</a:t>
-            </a:r>
-            <a:r>
-              <a:rPr lang="en-US" sz="1600" dirty="0" err="1">
-                <a:latin typeface="Consolas" panose="020B0609020204030204" pitchFamily="49" charset="0"/>
-              </a:rPr>
-              <a:t>badswap</a:t>
-            </a:r>
-            <a:r>
-              <a:rPr lang="en-US" sz="1600" dirty="0">
-                <a:latin typeface="Consolas" panose="020B0609020204030204" pitchFamily="49" charset="0"/>
-              </a:rPr>
-              <a:t> q </a:t>
-            </a:r>
-            <a:r>
-              <a:rPr lang="en-US" sz="1600" dirty="0" err="1">
-                <a:latin typeface="Consolas" panose="020B0609020204030204" pitchFamily="49" charset="0"/>
-              </a:rPr>
-              <a:t>tmp</a:t>
-            </a:r>
-            <a:r>
-              <a:rPr lang="en-US" sz="1600" dirty="0">
-                <a:latin typeface="Consolas" panose="020B0609020204030204" pitchFamily="49" charset="0"/>
-              </a:rPr>
-              <a:t>) ; variables are not swapped</a:t>
+        <p:spPr/>
+        <p:txBody>
+          <a:bodyPr/>
+          <a:lstStyle/>
+          <a:p>
+            <a:r>
+              <a:rPr lang="en-US" dirty="0"/>
+              <a:t>Do it in pairs</a:t>
             </a:r>
           </a:p>
         </p:txBody>
@@ -6323,7 +6867,7 @@
     </p:spTree>
     <p:extLst>
       <p:ext uri="{BB962C8B-B14F-4D97-AF65-F5344CB8AC3E}">
-        <p14:creationId xmlns:p14="http://schemas.microsoft.com/office/powerpoint/2010/main" val="3608643309"/>
+        <p14:creationId xmlns:p14="http://schemas.microsoft.com/office/powerpoint/2010/main" val="2962610783"/>
       </p:ext>
     </p:extLst>
   </p:cSld>
@@ -6355,7 +6899,7 @@
           <p:cNvPr id="2" name="Title 1">
             <a:extLst>
               <a:ext uri="{FF2B5EF4-FFF2-40B4-BE49-F238E27FC236}">
-                <a16:creationId xmlns:a16="http://schemas.microsoft.com/office/drawing/2014/main" id="{3AF57412-F958-44E1-BD9C-13649DD46B23}"/>
+                <a16:creationId xmlns:a16="http://schemas.microsoft.com/office/drawing/2014/main" id="{DC1A6D24-D371-45ED-AD5D-B77280709DE1}"/>
               </a:ext>
             </a:extLst>
           </p:cNvPr>
@@ -6373,95 +6917,286 @@
           <a:p>
             <a:r>
               <a:rPr lang="en-US" dirty="0"/>
-              <a:t>2 Types of Variable Captures Problems</a:t>
-            </a:r>
-          </a:p>
-        </p:txBody>
-      </p:sp>
-      <p:sp>
-        <p:nvSpPr>
-          <p:cNvPr id="3" name="Content Placeholder 2">
-            <a:extLst>
-              <a:ext uri="{FF2B5EF4-FFF2-40B4-BE49-F238E27FC236}">
-                <a16:creationId xmlns:a16="http://schemas.microsoft.com/office/drawing/2014/main" id="{4D5B56F0-33E9-4916-97D2-8C007D15AEC4}"/>
-              </a:ext>
-            </a:extLst>
-          </p:cNvPr>
-          <p:cNvSpPr>
-            <a:spLocks noGrp="1"/>
-          </p:cNvSpPr>
-          <p:nvPr>
-            <p:ph idx="1"/>
-          </p:nvPr>
-        </p:nvSpPr>
-        <p:spPr/>
-        <p:txBody>
-          <a:bodyPr>
-            <a:normAutofit/>
+              <a:t>Macro templates are good but have limits</a:t>
+            </a:r>
+          </a:p>
+        </p:txBody>
+      </p:sp>
+      <p:sp>
+        <p:nvSpPr>
+          <p:cNvPr id="4" name="Rectangle 3">
+            <a:extLst>
+              <a:ext uri="{FF2B5EF4-FFF2-40B4-BE49-F238E27FC236}">
+                <a16:creationId xmlns:a16="http://schemas.microsoft.com/office/drawing/2014/main" id="{63207CD5-4E34-42E3-A2B6-23CA51269998}"/>
+              </a:ext>
+            </a:extLst>
+          </p:cNvPr>
+          <p:cNvSpPr/>
+          <p:nvPr/>
+        </p:nvSpPr>
+        <p:spPr>
+          <a:xfrm>
+            <a:off x="177477" y="1690688"/>
+            <a:ext cx="11825469" cy="2585323"/>
+          </a:xfrm>
+          <a:prstGeom prst="rect">
+            <a:avLst/>
+          </a:prstGeom>
+        </p:spPr>
+        <p:txBody>
+          <a:bodyPr wrap="square">
+            <a:spAutoFit/>
           </a:bodyPr>
           <a:lstStyle/>
           <a:p>
-            <a:pPr marL="0" indent="0">
-              <a:buNone/>
-            </a:pPr>
-            <a:r>
-              <a:rPr lang="en-US" dirty="0"/>
-              <a:t>A variable created by the macro “captures” some name that has meaning to the program that calls the macro and changes it</a:t>
-            </a:r>
-          </a:p>
-          <a:p>
-            <a:pPr marL="0" indent="0">
-              <a:buNone/>
-            </a:pPr>
-            <a:endParaRPr lang="en-US" dirty="0"/>
-          </a:p>
-          <a:p>
-            <a:pPr marL="0" indent="0">
-              <a:buNone/>
-            </a:pPr>
-            <a:r>
-              <a:rPr lang="en-US" dirty="0"/>
-              <a:t>The local context in which the macro is called “captures” some free variable intended to be global context from where the macro was declared</a:t>
-            </a:r>
-          </a:p>
-          <a:p>
-            <a:pPr marL="0" indent="0">
-              <a:buNone/>
-            </a:pPr>
-            <a:endParaRPr lang="en-US" dirty="0"/>
-          </a:p>
-          <a:p>
-            <a:pPr marL="0" indent="0">
-              <a:buNone/>
-            </a:pPr>
             <a:r>
               <a:rPr lang="en-US" dirty="0">
                 <a:latin typeface="Consolas" panose="020B0609020204030204" pitchFamily="49" charset="0"/>
               </a:rPr>
-              <a:t>(let ((set! '(1 2 3)))</a:t>
-            </a:r>
-          </a:p>
-          <a:p>
-            <a:pPr marL="0" indent="0">
-              <a:buNone/>
-            </a:pPr>
+              <a:t>(define-syntax </a:t>
+            </a:r>
+            <a:r>
+              <a:rPr lang="en-US" dirty="0" err="1">
+                <a:latin typeface="Consolas" panose="020B0609020204030204" pitchFamily="49" charset="0"/>
+              </a:rPr>
+              <a:t>numed-syms</a:t>
+            </a:r>
+            <a:endParaRPr lang="en-US" dirty="0">
+              <a:latin typeface="Consolas" panose="020B0609020204030204" pitchFamily="49" charset="0"/>
+            </a:endParaRPr>
+          </a:p>
+          <a:p>
             <a:r>
               <a:rPr lang="en-US" dirty="0">
                 <a:latin typeface="Consolas" panose="020B0609020204030204" pitchFamily="49" charset="0"/>
               </a:rPr>
-              <a:t>  (</a:t>
+              <a:t>  (lambda (</a:t>
             </a:r>
             <a:r>
               <a:rPr lang="en-US" dirty="0" err="1">
                 <a:latin typeface="Consolas" panose="020B0609020204030204" pitchFamily="49" charset="0"/>
               </a:rPr>
-              <a:t>badswap</a:t>
+              <a:t>stx</a:t>
             </a:r>
             <a:r>
               <a:rPr lang="en-US" dirty="0">
                 <a:latin typeface="Consolas" panose="020B0609020204030204" pitchFamily="49" charset="0"/>
               </a:rPr>
-              <a:t> a b))</a:t>
+              <a:t>)</a:t>
+            </a:r>
+          </a:p>
+          <a:p>
+            <a:r>
+              <a:rPr lang="en-US" dirty="0">
+                <a:latin typeface="Consolas" panose="020B0609020204030204" pitchFamily="49" charset="0"/>
+              </a:rPr>
+              <a:t>    (datum-&gt;syntax </a:t>
+            </a:r>
+            <a:r>
+              <a:rPr lang="en-US" dirty="0" err="1">
+                <a:latin typeface="Consolas" panose="020B0609020204030204" pitchFamily="49" charset="0"/>
+              </a:rPr>
+              <a:t>stx</a:t>
+            </a:r>
+            <a:endParaRPr lang="en-US" dirty="0">
+              <a:latin typeface="Consolas" panose="020B0609020204030204" pitchFamily="49" charset="0"/>
+            </a:endParaRPr>
+          </a:p>
+          <a:p>
+            <a:r>
+              <a:rPr lang="en-US" dirty="0">
+                <a:latin typeface="Consolas" panose="020B0609020204030204" pitchFamily="49" charset="0"/>
+              </a:rPr>
+              <a:t>                   (list 'quote (let recur ([num 0]</a:t>
+            </a:r>
+          </a:p>
+          <a:p>
+            <a:r>
+              <a:rPr lang="en-US" dirty="0">
+                <a:latin typeface="Consolas" panose="020B0609020204030204" pitchFamily="49" charset="0"/>
+              </a:rPr>
+              <a:t>                                            [</a:t>
+            </a:r>
+            <a:r>
+              <a:rPr lang="en-US" dirty="0" err="1">
+                <a:latin typeface="Consolas" panose="020B0609020204030204" pitchFamily="49" charset="0"/>
+              </a:rPr>
+              <a:t>syms</a:t>
+            </a:r>
+            <a:r>
+              <a:rPr lang="en-US" dirty="0">
+                <a:latin typeface="Consolas" panose="020B0609020204030204" pitchFamily="49" charset="0"/>
+              </a:rPr>
+              <a:t> (</a:t>
+            </a:r>
+            <a:r>
+              <a:rPr lang="en-US" dirty="0" err="1">
+                <a:latin typeface="Consolas" panose="020B0609020204030204" pitchFamily="49" charset="0"/>
+              </a:rPr>
+              <a:t>cdr</a:t>
+            </a:r>
+            <a:r>
+              <a:rPr lang="en-US" dirty="0">
+                <a:latin typeface="Consolas" panose="020B0609020204030204" pitchFamily="49" charset="0"/>
+              </a:rPr>
+              <a:t> (syntax-&gt;datum </a:t>
+            </a:r>
+            <a:r>
+              <a:rPr lang="en-US" dirty="0" err="1">
+                <a:latin typeface="Consolas" panose="020B0609020204030204" pitchFamily="49" charset="0"/>
+              </a:rPr>
+              <a:t>stx</a:t>
+            </a:r>
+            <a:r>
+              <a:rPr lang="en-US" dirty="0">
+                <a:latin typeface="Consolas" panose="020B0609020204030204" pitchFamily="49" charset="0"/>
+              </a:rPr>
+              <a:t>))])</a:t>
+            </a:r>
+          </a:p>
+          <a:p>
+            <a:r>
+              <a:rPr lang="en-US" dirty="0">
+                <a:latin typeface="Consolas" panose="020B0609020204030204" pitchFamily="49" charset="0"/>
+              </a:rPr>
+              <a:t>                                      (if (null? </a:t>
+            </a:r>
+            <a:r>
+              <a:rPr lang="en-US" dirty="0" err="1">
+                <a:latin typeface="Consolas" panose="020B0609020204030204" pitchFamily="49" charset="0"/>
+              </a:rPr>
+              <a:t>syms</a:t>
+            </a:r>
+            <a:r>
+              <a:rPr lang="en-US" dirty="0">
+                <a:latin typeface="Consolas" panose="020B0609020204030204" pitchFamily="49" charset="0"/>
+              </a:rPr>
+              <a:t>)</a:t>
+            </a:r>
+          </a:p>
+          <a:p>
+            <a:r>
+              <a:rPr lang="en-US" dirty="0">
+                <a:latin typeface="Consolas" panose="020B0609020204030204" pitchFamily="49" charset="0"/>
+              </a:rPr>
+              <a:t>                                          '()</a:t>
+            </a:r>
+          </a:p>
+          <a:p>
+            <a:r>
+              <a:rPr lang="en-US" dirty="0">
+                <a:latin typeface="Consolas" panose="020B0609020204030204" pitchFamily="49" charset="0"/>
+              </a:rPr>
+              <a:t>                                          (cons (cons (car </a:t>
+            </a:r>
+            <a:r>
+              <a:rPr lang="en-US" dirty="0" err="1">
+                <a:latin typeface="Consolas" panose="020B0609020204030204" pitchFamily="49" charset="0"/>
+              </a:rPr>
+              <a:t>syms</a:t>
+            </a:r>
+            <a:r>
+              <a:rPr lang="en-US" dirty="0">
+                <a:latin typeface="Consolas" panose="020B0609020204030204" pitchFamily="49" charset="0"/>
+              </a:rPr>
+              <a:t>) num)</a:t>
+            </a:r>
+          </a:p>
+          <a:p>
+            <a:r>
+              <a:rPr lang="en-US" dirty="0">
+                <a:latin typeface="Consolas" panose="020B0609020204030204" pitchFamily="49" charset="0"/>
+              </a:rPr>
+              <a:t>                                                (recur (add1 num) (</a:t>
+            </a:r>
+            <a:r>
+              <a:rPr lang="en-US" dirty="0" err="1">
+                <a:latin typeface="Consolas" panose="020B0609020204030204" pitchFamily="49" charset="0"/>
+              </a:rPr>
+              <a:t>cdr</a:t>
+            </a:r>
+            <a:r>
+              <a:rPr lang="en-US" dirty="0">
+                <a:latin typeface="Consolas" panose="020B0609020204030204" pitchFamily="49" charset="0"/>
+              </a:rPr>
+              <a:t> </a:t>
+            </a:r>
+            <a:r>
+              <a:rPr lang="en-US" dirty="0" err="1">
+                <a:latin typeface="Consolas" panose="020B0609020204030204" pitchFamily="49" charset="0"/>
+              </a:rPr>
+              <a:t>syms</a:t>
+            </a:r>
+            <a:r>
+              <a:rPr lang="en-US" dirty="0">
+                <a:latin typeface="Consolas" panose="020B0609020204030204" pitchFamily="49" charset="0"/>
+              </a:rPr>
+              <a:t>)))))))))</a:t>
+            </a:r>
+          </a:p>
+        </p:txBody>
+      </p:sp>
+      <p:pic>
+        <p:nvPicPr>
+          <p:cNvPr id="3" name="Picture 2">
+            <a:extLst>
+              <a:ext uri="{FF2B5EF4-FFF2-40B4-BE49-F238E27FC236}">
+                <a16:creationId xmlns:a16="http://schemas.microsoft.com/office/drawing/2014/main" id="{CF71ACAB-4939-4DF9-ADC1-0D0B21C1F7B1}"/>
+              </a:ext>
+            </a:extLst>
+          </p:cNvPr>
+          <p:cNvPicPr>
+            <a:picLocks noChangeAspect="1"/>
+          </p:cNvPicPr>
+          <p:nvPr/>
+        </p:nvPicPr>
+        <p:blipFill>
+          <a:blip r:embed="rId2"/>
+          <a:stretch>
+            <a:fillRect/>
+          </a:stretch>
+        </p:blipFill>
+        <p:spPr>
+          <a:xfrm>
+            <a:off x="519089" y="4643364"/>
+            <a:ext cx="4648849" cy="523948"/>
+          </a:xfrm>
+          <a:prstGeom prst="rect">
+            <a:avLst/>
+          </a:prstGeom>
+        </p:spPr>
+      </p:pic>
+      <p:sp>
+        <p:nvSpPr>
+          <p:cNvPr id="5" name="TextBox 4">
+            <a:extLst>
+              <a:ext uri="{FF2B5EF4-FFF2-40B4-BE49-F238E27FC236}">
+                <a16:creationId xmlns:a16="http://schemas.microsoft.com/office/drawing/2014/main" id="{41A635F0-CF50-4D32-95EA-EF00A77E052D}"/>
+              </a:ext>
+            </a:extLst>
+          </p:cNvPr>
+          <p:cNvSpPr txBox="1"/>
+          <p:nvPr/>
+        </p:nvSpPr>
+        <p:spPr>
+          <a:xfrm>
+            <a:off x="1493134" y="6007261"/>
+            <a:ext cx="6812249" cy="461665"/>
+          </a:xfrm>
+          <a:prstGeom prst="rect">
+            <a:avLst/>
+          </a:prstGeom>
+          <a:noFill/>
+        </p:spPr>
+        <p:txBody>
+          <a:bodyPr wrap="none" rtlCol="0">
+            <a:spAutoFit/>
+          </a:bodyPr>
+          <a:lstStyle/>
+          <a:p>
+            <a:r>
+              <a:rPr lang="en-US" sz="2400" dirty="0"/>
+              <a:t>By treating code as fully data, we get plenty of power</a:t>
             </a:r>
           </a:p>
         </p:txBody>
@@ -6469,7 +7204,7 @@
     </p:spTree>
     <p:extLst>
       <p:ext uri="{BB962C8B-B14F-4D97-AF65-F5344CB8AC3E}">
-        <p14:creationId xmlns:p14="http://schemas.microsoft.com/office/powerpoint/2010/main" val="1153656585"/>
+        <p14:creationId xmlns:p14="http://schemas.microsoft.com/office/powerpoint/2010/main" val="2295695962"/>
       </p:ext>
     </p:extLst>
   </p:cSld>
@@ -6498,344 +7233,420 @@
       </p:grpSpPr>
       <p:sp>
         <p:nvSpPr>
-          <p:cNvPr id="4" name="Rectangle 3">
-            <a:extLst>
-              <a:ext uri="{FF2B5EF4-FFF2-40B4-BE49-F238E27FC236}">
-                <a16:creationId xmlns:a16="http://schemas.microsoft.com/office/drawing/2014/main" id="{A24BF837-4241-463D-9326-D6E299214759}"/>
-              </a:ext>
-            </a:extLst>
-          </p:cNvPr>
-          <p:cNvSpPr/>
-          <p:nvPr/>
+          <p:cNvPr id="2" name="Title 1">
+            <a:extLst>
+              <a:ext uri="{FF2B5EF4-FFF2-40B4-BE49-F238E27FC236}">
+                <a16:creationId xmlns:a16="http://schemas.microsoft.com/office/drawing/2014/main" id="{75F3D548-3E64-4CD6-BBE2-E8AB594A3236}"/>
+              </a:ext>
+            </a:extLst>
+          </p:cNvPr>
+          <p:cNvSpPr>
+            <a:spLocks noGrp="1"/>
+          </p:cNvSpPr>
+          <p:nvPr>
+            <p:ph type="title"/>
+          </p:nvPr>
         </p:nvSpPr>
         <p:spPr>
           <a:xfrm>
-            <a:off x="1103452" y="2246968"/>
-            <a:ext cx="8688729" cy="3416320"/>
+            <a:off x="838200" y="249379"/>
+            <a:ext cx="10515600" cy="792343"/>
           </a:xfrm>
-          <a:prstGeom prst="rect">
-            <a:avLst/>
-          </a:prstGeom>
         </p:spPr>
         <p:txBody>
-          <a:bodyPr wrap="square">
-            <a:spAutoFit/>
-          </a:bodyPr>
-          <a:lstStyle/>
-          <a:p>
-            <a:r>
-              <a:rPr lang="en-US" sz="3600" dirty="0">
-                <a:latin typeface="Consolas" panose="020B0609020204030204" pitchFamily="49" charset="0"/>
-              </a:rPr>
-              <a:t>(define-syntax (swap </a:t>
-            </a:r>
-            <a:r>
-              <a:rPr lang="en-US" sz="3600" dirty="0" err="1">
-                <a:latin typeface="Consolas" panose="020B0609020204030204" pitchFamily="49" charset="0"/>
-              </a:rPr>
-              <a:t>stx</a:t>
-            </a:r>
-            <a:r>
-              <a:rPr lang="en-US" sz="3600" dirty="0">
-                <a:latin typeface="Consolas" panose="020B0609020204030204" pitchFamily="49" charset="0"/>
-              </a:rPr>
-              <a:t>)</a:t>
-            </a:r>
-          </a:p>
-          <a:p>
-            <a:r>
-              <a:rPr lang="en-US" sz="3600" dirty="0">
-                <a:latin typeface="Consolas" panose="020B0609020204030204" pitchFamily="49" charset="0"/>
-              </a:rPr>
-              <a:t>  (syntax-case </a:t>
-            </a:r>
-            <a:r>
-              <a:rPr lang="en-US" sz="3600" dirty="0" err="1">
-                <a:latin typeface="Consolas" panose="020B0609020204030204" pitchFamily="49" charset="0"/>
-              </a:rPr>
-              <a:t>stx</a:t>
-            </a:r>
-            <a:r>
-              <a:rPr lang="en-US" sz="3600" dirty="0">
-                <a:latin typeface="Consolas" panose="020B0609020204030204" pitchFamily="49" charset="0"/>
-              </a:rPr>
-              <a:t> ()</a:t>
-            </a:r>
-          </a:p>
-          <a:p>
-            <a:r>
-              <a:rPr lang="en-US" sz="3600" dirty="0">
-                <a:latin typeface="Consolas" panose="020B0609020204030204" pitchFamily="49" charset="0"/>
-              </a:rPr>
-              <a:t>    [(swap x y)</a:t>
-            </a:r>
-          </a:p>
-          <a:p>
-            <a:r>
-              <a:rPr lang="en-US" sz="3600" dirty="0">
-                <a:latin typeface="Consolas" panose="020B0609020204030204" pitchFamily="49" charset="0"/>
-              </a:rPr>
-              <a:t>     #'(let ([</a:t>
-            </a:r>
-            <a:r>
-              <a:rPr lang="en-US" sz="3600" dirty="0" err="1">
-                <a:latin typeface="Consolas" panose="020B0609020204030204" pitchFamily="49" charset="0"/>
-              </a:rPr>
-              <a:t>tmp</a:t>
-            </a:r>
-            <a:r>
-              <a:rPr lang="en-US" sz="3600" dirty="0">
-                <a:latin typeface="Consolas" panose="020B0609020204030204" pitchFamily="49" charset="0"/>
-              </a:rPr>
-              <a:t> x])</a:t>
-            </a:r>
-          </a:p>
-          <a:p>
-            <a:r>
-              <a:rPr lang="en-US" sz="3600" dirty="0">
-                <a:latin typeface="Consolas" panose="020B0609020204030204" pitchFamily="49" charset="0"/>
-              </a:rPr>
-              <a:t>         (set! x y)</a:t>
-            </a:r>
-          </a:p>
-          <a:p>
-            <a:r>
-              <a:rPr lang="en-US" sz="3600" dirty="0">
-                <a:latin typeface="Consolas" panose="020B0609020204030204" pitchFamily="49" charset="0"/>
-              </a:rPr>
-              <a:t>         (set! y </a:t>
-            </a:r>
-            <a:r>
-              <a:rPr lang="en-US" sz="3600" dirty="0" err="1">
-                <a:latin typeface="Consolas" panose="020B0609020204030204" pitchFamily="49" charset="0"/>
-              </a:rPr>
-              <a:t>tmp</a:t>
-            </a:r>
-            <a:r>
-              <a:rPr lang="en-US" sz="3600" dirty="0">
-                <a:latin typeface="Consolas" panose="020B0609020204030204" pitchFamily="49" charset="0"/>
-              </a:rPr>
-              <a:t>))]))</a:t>
-            </a:r>
-          </a:p>
-        </p:txBody>
-      </p:sp>
-      <p:sp>
-        <p:nvSpPr>
-          <p:cNvPr id="6" name="Callout: Line 5">
-            <a:extLst>
-              <a:ext uri="{FF2B5EF4-FFF2-40B4-BE49-F238E27FC236}">
-                <a16:creationId xmlns:a16="http://schemas.microsoft.com/office/drawing/2014/main" id="{2CBE7812-8F67-4DD1-8FD8-4E2CC7EEBF31}"/>
-              </a:ext>
-            </a:extLst>
-          </p:cNvPr>
-          <p:cNvSpPr/>
-          <p:nvPr/>
+          <a:bodyPr/>
+          <a:lstStyle/>
+          <a:p>
+            <a:r>
+              <a:rPr lang="en-US" dirty="0"/>
+              <a:t>Variable Capture Problems</a:t>
+            </a:r>
+          </a:p>
+        </p:txBody>
+      </p:sp>
+      <p:sp>
+        <p:nvSpPr>
+          <p:cNvPr id="3" name="Content Placeholder 2">
+            <a:extLst>
+              <a:ext uri="{FF2B5EF4-FFF2-40B4-BE49-F238E27FC236}">
+                <a16:creationId xmlns:a16="http://schemas.microsoft.com/office/drawing/2014/main" id="{84391CD8-05AB-4B2E-BD40-A2E3D48D0286}"/>
+              </a:ext>
+            </a:extLst>
+          </p:cNvPr>
+          <p:cNvSpPr>
+            <a:spLocks noGrp="1"/>
+          </p:cNvSpPr>
+          <p:nvPr>
+            <p:ph idx="1"/>
+          </p:nvPr>
         </p:nvSpPr>
         <p:spPr>
           <a:xfrm>
-            <a:off x="7812912" y="2409014"/>
-            <a:ext cx="3368233" cy="1182032"/>
-          </a:xfrm>
-          <a:prstGeom prst="borderCallout1">
-            <a:avLst>
-              <a:gd name="adj1" fmla="val 39314"/>
-              <a:gd name="adj2" fmla="val 1289"/>
-              <a:gd name="adj3" fmla="val 109562"/>
-              <a:gd name="adj4" fmla="val -104656"/>
-            </a:avLst>
-          </a:prstGeom>
-          <a:solidFill>
-            <a:schemeClr val="accent1">
-              <a:lumMod val="20000"/>
-              <a:lumOff val="80000"/>
-            </a:schemeClr>
-          </a:solidFill>
-        </p:spPr>
-        <p:style>
-          <a:lnRef idx="2">
-            <a:schemeClr val="dk1"/>
-          </a:lnRef>
-          <a:fillRef idx="1">
-            <a:schemeClr val="lt1"/>
-          </a:fillRef>
-          <a:effectRef idx="0">
-            <a:schemeClr val="dk1"/>
-          </a:effectRef>
-          <a:fontRef idx="minor">
-            <a:schemeClr val="dk1"/>
-          </a:fontRef>
-        </p:style>
-        <p:txBody>
-          <a:bodyPr rtlCol="0" anchor="ctr"/>
-          <a:lstStyle/>
-          <a:p>
-            <a:pPr algn="ctr"/>
-            <a:r>
-              <a:rPr lang="en-US" dirty="0"/>
-              <a:t>X and Y and syntax objects with their own namespace</a:t>
-            </a:r>
-          </a:p>
-        </p:txBody>
-      </p:sp>
-      <p:sp>
-        <p:nvSpPr>
-          <p:cNvPr id="7" name="Callout: Line 6">
-            <a:extLst>
-              <a:ext uri="{FF2B5EF4-FFF2-40B4-BE49-F238E27FC236}">
-                <a16:creationId xmlns:a16="http://schemas.microsoft.com/office/drawing/2014/main" id="{0EDBC9F2-1F3E-49FD-9D40-D288ACD7D710}"/>
-              </a:ext>
-            </a:extLst>
-          </p:cNvPr>
-          <p:cNvSpPr/>
-          <p:nvPr/>
-        </p:nvSpPr>
-        <p:spPr>
-          <a:xfrm>
-            <a:off x="8254679" y="4940830"/>
-            <a:ext cx="3368233" cy="1182032"/>
-          </a:xfrm>
-          <a:prstGeom prst="borderCallout1">
-            <a:avLst>
-              <a:gd name="adj1" fmla="val 39314"/>
-              <a:gd name="adj2" fmla="val 1289"/>
-              <a:gd name="adj3" fmla="val -37321"/>
-              <a:gd name="adj4" fmla="val -88505"/>
-            </a:avLst>
-          </a:prstGeom>
-          <a:solidFill>
-            <a:schemeClr val="accent1">
-              <a:lumMod val="20000"/>
-              <a:lumOff val="80000"/>
-            </a:schemeClr>
-          </a:solidFill>
-        </p:spPr>
-        <p:style>
-          <a:lnRef idx="2">
-            <a:schemeClr val="dk1"/>
-          </a:lnRef>
-          <a:fillRef idx="1">
-            <a:schemeClr val="lt1"/>
-          </a:fillRef>
-          <a:effectRef idx="0">
-            <a:schemeClr val="dk1"/>
-          </a:effectRef>
-          <a:fontRef idx="minor">
-            <a:schemeClr val="dk1"/>
-          </a:fontRef>
-        </p:style>
-        <p:txBody>
-          <a:bodyPr rtlCol="0" anchor="ctr"/>
-          <a:lstStyle/>
-          <a:p>
-            <a:pPr algn="ctr"/>
-            <a:r>
-              <a:rPr lang="en-US" dirty="0"/>
-              <a:t>The variable created here has a different namespace</a:t>
-            </a:r>
-          </a:p>
-        </p:txBody>
-      </p:sp>
-      <p:sp>
-        <p:nvSpPr>
-          <p:cNvPr id="8" name="Title 1">
-            <a:extLst>
-              <a:ext uri="{FF2B5EF4-FFF2-40B4-BE49-F238E27FC236}">
-                <a16:creationId xmlns:a16="http://schemas.microsoft.com/office/drawing/2014/main" id="{1C72843B-AC5B-4040-AADB-33CBDB0992D0}"/>
-              </a:ext>
-            </a:extLst>
-          </p:cNvPr>
-          <p:cNvSpPr>
-            <a:spLocks noGrp="1"/>
-          </p:cNvSpPr>
-          <p:nvPr>
-            <p:ph type="title"/>
-          </p:nvPr>
-        </p:nvSpPr>
-        <p:spPr>
-          <a:xfrm>
-            <a:off x="838200" y="365125"/>
-            <a:ext cx="10515600" cy="1325563"/>
+            <a:off x="838200" y="1157468"/>
+            <a:ext cx="10515600" cy="5602147"/>
           </a:xfrm>
         </p:spPr>
         <p:txBody>
-          <a:bodyPr/>
-          <a:lstStyle/>
-          <a:p>
-            <a:r>
-              <a:rPr lang="en-US" dirty="0"/>
-              <a:t>Mostly solved by racket syntax</a:t>
-            </a:r>
-          </a:p>
-        </p:txBody>
-      </p:sp>
-      <p:sp>
-        <p:nvSpPr>
-          <p:cNvPr id="9" name="Callout: Line 8">
-            <a:extLst>
-              <a:ext uri="{FF2B5EF4-FFF2-40B4-BE49-F238E27FC236}">
-                <a16:creationId xmlns:a16="http://schemas.microsoft.com/office/drawing/2014/main" id="{D043020A-8D56-45B2-A8A3-4036875AD7E0}"/>
-              </a:ext>
-            </a:extLst>
-          </p:cNvPr>
-          <p:cNvSpPr/>
-          <p:nvPr/>
-        </p:nvSpPr>
-        <p:spPr>
-          <a:xfrm>
-            <a:off x="1103452" y="5683822"/>
-            <a:ext cx="3368233" cy="1182032"/>
-          </a:xfrm>
-          <a:prstGeom prst="borderCallout1">
-            <a:avLst>
-              <a:gd name="adj1" fmla="val -1401"/>
-              <a:gd name="adj2" fmla="val 40225"/>
-              <a:gd name="adj3" fmla="val -22053"/>
-              <a:gd name="adj4" fmla="val 75810"/>
-            </a:avLst>
-          </a:prstGeom>
-          <a:solidFill>
-            <a:schemeClr val="accent1">
-              <a:lumMod val="20000"/>
-              <a:lumOff val="80000"/>
-            </a:schemeClr>
-          </a:solidFill>
-        </p:spPr>
-        <p:style>
-          <a:lnRef idx="2">
-            <a:schemeClr val="dk1"/>
-          </a:lnRef>
-          <a:fillRef idx="1">
-            <a:schemeClr val="lt1"/>
-          </a:fillRef>
-          <a:effectRef idx="0">
-            <a:schemeClr val="dk1"/>
-          </a:effectRef>
-          <a:fontRef idx="minor">
-            <a:schemeClr val="dk1"/>
-          </a:fontRef>
-        </p:style>
-        <p:txBody>
-          <a:bodyPr rtlCol="0" anchor="ctr"/>
-          <a:lstStyle/>
-          <a:p>
-            <a:pPr algn="ctr"/>
-            <a:r>
-              <a:rPr lang="en-US" dirty="0"/>
-              <a:t>Variables referenced within the macro use the macro’s </a:t>
-            </a:r>
-            <a:r>
-              <a:rPr lang="en-US" dirty="0" err="1"/>
-              <a:t>namspace</a:t>
-            </a:r>
-            <a:endParaRPr lang="en-US" dirty="0"/>
+          <a:bodyPr>
+            <a:normAutofit/>
+          </a:bodyPr>
+          <a:lstStyle/>
+          <a:p>
+            <a:pPr marL="0" indent="0">
+              <a:buNone/>
+            </a:pPr>
+            <a:r>
+              <a:rPr lang="en-US" sz="1600" dirty="0">
+                <a:latin typeface="Consolas" panose="020B0609020204030204" pitchFamily="49" charset="0"/>
+              </a:rPr>
+              <a:t>(define-syntax </a:t>
+            </a:r>
+            <a:r>
+              <a:rPr lang="en-US" sz="1600" dirty="0" err="1">
+                <a:latin typeface="Consolas" panose="020B0609020204030204" pitchFamily="49" charset="0"/>
+              </a:rPr>
+              <a:t>badswap</a:t>
+            </a:r>
+            <a:endParaRPr lang="en-US" sz="1600" dirty="0">
+              <a:latin typeface="Consolas" panose="020B0609020204030204" pitchFamily="49" charset="0"/>
+            </a:endParaRPr>
+          </a:p>
+          <a:p>
+            <a:pPr marL="0" indent="0">
+              <a:buNone/>
+            </a:pPr>
+            <a:r>
+              <a:rPr lang="en-US" sz="1600" dirty="0">
+                <a:latin typeface="Consolas" panose="020B0609020204030204" pitchFamily="49" charset="0"/>
+              </a:rPr>
+              <a:t>  (lambda (</a:t>
+            </a:r>
+            <a:r>
+              <a:rPr lang="en-US" sz="1600" dirty="0" err="1">
+                <a:latin typeface="Consolas" panose="020B0609020204030204" pitchFamily="49" charset="0"/>
+              </a:rPr>
+              <a:t>stx</a:t>
+            </a:r>
+            <a:r>
+              <a:rPr lang="en-US" sz="1600" dirty="0">
+                <a:latin typeface="Consolas" panose="020B0609020204030204" pitchFamily="49" charset="0"/>
+              </a:rPr>
+              <a:t>)</a:t>
+            </a:r>
+          </a:p>
+          <a:p>
+            <a:pPr marL="0" indent="0">
+              <a:buNone/>
+            </a:pPr>
+            <a:r>
+              <a:rPr lang="en-US" sz="1600" dirty="0">
+                <a:latin typeface="Consolas" panose="020B0609020204030204" pitchFamily="49" charset="0"/>
+              </a:rPr>
+              <a:t>    (datum-&gt;syntax </a:t>
+            </a:r>
+            <a:r>
+              <a:rPr lang="en-US" sz="1600" dirty="0" err="1">
+                <a:latin typeface="Consolas" panose="020B0609020204030204" pitchFamily="49" charset="0"/>
+              </a:rPr>
+              <a:t>stx</a:t>
+            </a:r>
+            <a:r>
+              <a:rPr lang="en-US" sz="1600" dirty="0">
+                <a:latin typeface="Consolas" panose="020B0609020204030204" pitchFamily="49" charset="0"/>
+              </a:rPr>
+              <a:t> (let* ([</a:t>
+            </a:r>
+            <a:r>
+              <a:rPr lang="en-US" sz="1600" dirty="0" err="1">
+                <a:latin typeface="Consolas" panose="020B0609020204030204" pitchFamily="49" charset="0"/>
+              </a:rPr>
+              <a:t>orig</a:t>
+            </a:r>
+            <a:r>
+              <a:rPr lang="en-US" sz="1600" dirty="0">
+                <a:latin typeface="Consolas" panose="020B0609020204030204" pitchFamily="49" charset="0"/>
+              </a:rPr>
+              <a:t> (syntax-&gt;datum </a:t>
+            </a:r>
+            <a:r>
+              <a:rPr lang="en-US" sz="1600" dirty="0" err="1">
+                <a:latin typeface="Consolas" panose="020B0609020204030204" pitchFamily="49" charset="0"/>
+              </a:rPr>
+              <a:t>stx</a:t>
+            </a:r>
+            <a:r>
+              <a:rPr lang="en-US" sz="1600" dirty="0">
+                <a:latin typeface="Consolas" panose="020B0609020204030204" pitchFamily="49" charset="0"/>
+              </a:rPr>
+              <a:t>)]</a:t>
+            </a:r>
+          </a:p>
+          <a:p>
+            <a:pPr marL="0" indent="0">
+              <a:buNone/>
+            </a:pPr>
+            <a:r>
+              <a:rPr lang="en-US" sz="1600" dirty="0">
+                <a:latin typeface="Consolas" panose="020B0609020204030204" pitchFamily="49" charset="0"/>
+              </a:rPr>
+              <a:t>                              [v1 (</a:t>
+            </a:r>
+            <a:r>
+              <a:rPr lang="en-US" sz="1600" dirty="0" err="1">
+                <a:latin typeface="Consolas" panose="020B0609020204030204" pitchFamily="49" charset="0"/>
+              </a:rPr>
+              <a:t>cadr</a:t>
+            </a:r>
+            <a:r>
+              <a:rPr lang="en-US" sz="1600" dirty="0">
+                <a:latin typeface="Consolas" panose="020B0609020204030204" pitchFamily="49" charset="0"/>
+              </a:rPr>
+              <a:t> </a:t>
+            </a:r>
+            <a:r>
+              <a:rPr lang="en-US" sz="1600" dirty="0" err="1">
+                <a:latin typeface="Consolas" panose="020B0609020204030204" pitchFamily="49" charset="0"/>
+              </a:rPr>
+              <a:t>orig</a:t>
+            </a:r>
+            <a:r>
+              <a:rPr lang="en-US" sz="1600" dirty="0">
+                <a:latin typeface="Consolas" panose="020B0609020204030204" pitchFamily="49" charset="0"/>
+              </a:rPr>
+              <a:t>)]</a:t>
+            </a:r>
+          </a:p>
+          <a:p>
+            <a:pPr marL="0" indent="0">
+              <a:buNone/>
+            </a:pPr>
+            <a:r>
+              <a:rPr lang="en-US" sz="1600" dirty="0">
+                <a:latin typeface="Consolas" panose="020B0609020204030204" pitchFamily="49" charset="0"/>
+              </a:rPr>
+              <a:t>                              [v2 (</a:t>
+            </a:r>
+            <a:r>
+              <a:rPr lang="en-US" sz="1600" dirty="0" err="1">
+                <a:latin typeface="Consolas" panose="020B0609020204030204" pitchFamily="49" charset="0"/>
+              </a:rPr>
+              <a:t>caddr</a:t>
+            </a:r>
+            <a:r>
+              <a:rPr lang="en-US" sz="1600" dirty="0">
+                <a:latin typeface="Consolas" panose="020B0609020204030204" pitchFamily="49" charset="0"/>
+              </a:rPr>
+              <a:t> </a:t>
+            </a:r>
+            <a:r>
+              <a:rPr lang="en-US" sz="1600" dirty="0" err="1">
+                <a:latin typeface="Consolas" panose="020B0609020204030204" pitchFamily="49" charset="0"/>
+              </a:rPr>
+              <a:t>orig</a:t>
+            </a:r>
+            <a:r>
+              <a:rPr lang="en-US" sz="1600" dirty="0">
+                <a:latin typeface="Consolas" panose="020B0609020204030204" pitchFamily="49" charset="0"/>
+              </a:rPr>
+              <a:t>)])</a:t>
+            </a:r>
+          </a:p>
+          <a:p>
+            <a:pPr marL="0" indent="0">
+              <a:buNone/>
+            </a:pPr>
+            <a:r>
+              <a:rPr lang="en-US" sz="1600" dirty="0">
+                <a:latin typeface="Consolas" panose="020B0609020204030204" pitchFamily="49" charset="0"/>
+              </a:rPr>
+              <a:t>                         (list 'let (list (list '</a:t>
+            </a:r>
+            <a:r>
+              <a:rPr lang="en-US" sz="1600" dirty="0" err="1">
+                <a:latin typeface="Consolas" panose="020B0609020204030204" pitchFamily="49" charset="0"/>
+              </a:rPr>
+              <a:t>tmp</a:t>
+            </a:r>
+            <a:r>
+              <a:rPr lang="en-US" sz="1600" dirty="0">
+                <a:latin typeface="Consolas" panose="020B0609020204030204" pitchFamily="49" charset="0"/>
+              </a:rPr>
+              <a:t> v1))</a:t>
+            </a:r>
+          </a:p>
+          <a:p>
+            <a:pPr marL="0" indent="0">
+              <a:buNone/>
+            </a:pPr>
+            <a:r>
+              <a:rPr lang="en-US" sz="1600" dirty="0">
+                <a:latin typeface="Consolas" panose="020B0609020204030204" pitchFamily="49" charset="0"/>
+              </a:rPr>
+              <a:t>                               (list 'set! v1 v2)</a:t>
+            </a:r>
+          </a:p>
+          <a:p>
+            <a:pPr marL="0" indent="0">
+              <a:buNone/>
+            </a:pPr>
+            <a:r>
+              <a:rPr lang="en-US" sz="1600" dirty="0">
+                <a:latin typeface="Consolas" panose="020B0609020204030204" pitchFamily="49" charset="0"/>
+              </a:rPr>
+              <a:t>                               (list 'set! v2 '</a:t>
+            </a:r>
+            <a:r>
+              <a:rPr lang="en-US" sz="1600" dirty="0" err="1">
+                <a:latin typeface="Consolas" panose="020B0609020204030204" pitchFamily="49" charset="0"/>
+              </a:rPr>
+              <a:t>tmp</a:t>
+            </a:r>
+            <a:r>
+              <a:rPr lang="en-US" sz="1600" dirty="0">
+                <a:latin typeface="Consolas" panose="020B0609020204030204" pitchFamily="49" charset="0"/>
+              </a:rPr>
+              <a:t>))))))</a:t>
+            </a:r>
+          </a:p>
+          <a:p>
+            <a:pPr marL="0" indent="0">
+              <a:buNone/>
+            </a:pPr>
+            <a:r>
+              <a:rPr lang="en-US" sz="1600" dirty="0">
+                <a:latin typeface="Consolas" panose="020B0609020204030204" pitchFamily="49" charset="0"/>
+              </a:rPr>
+              <a:t>      </a:t>
+            </a:r>
+          </a:p>
+          <a:p>
+            <a:pPr marL="0" indent="0">
+              <a:buNone/>
+            </a:pPr>
+            <a:endParaRPr lang="en-US" sz="1600" dirty="0">
+              <a:latin typeface="Consolas" panose="020B0609020204030204" pitchFamily="49" charset="0"/>
+            </a:endParaRPr>
+          </a:p>
+          <a:p>
+            <a:pPr marL="0" indent="0">
+              <a:buNone/>
+            </a:pPr>
+            <a:r>
+              <a:rPr lang="en-US" sz="1600" dirty="0">
+                <a:latin typeface="Consolas" panose="020B0609020204030204" pitchFamily="49" charset="0"/>
+              </a:rPr>
+              <a:t>(define a 1)</a:t>
+            </a:r>
+          </a:p>
+          <a:p>
+            <a:pPr marL="0" indent="0">
+              <a:buNone/>
+            </a:pPr>
+            <a:r>
+              <a:rPr lang="en-US" sz="1600" dirty="0">
+                <a:latin typeface="Consolas" panose="020B0609020204030204" pitchFamily="49" charset="0"/>
+              </a:rPr>
+              <a:t>(define b 2)</a:t>
+            </a:r>
+          </a:p>
+          <a:p>
+            <a:pPr marL="0" indent="0">
+              <a:buNone/>
+            </a:pPr>
+            <a:r>
+              <a:rPr lang="en-US" sz="1600" dirty="0">
+                <a:latin typeface="Consolas" panose="020B0609020204030204" pitchFamily="49" charset="0"/>
+              </a:rPr>
+              <a:t>(</a:t>
+            </a:r>
+            <a:r>
+              <a:rPr lang="en-US" sz="1600" dirty="0" err="1">
+                <a:latin typeface="Consolas" panose="020B0609020204030204" pitchFamily="49" charset="0"/>
+              </a:rPr>
+              <a:t>badswap</a:t>
+            </a:r>
+            <a:r>
+              <a:rPr lang="en-US" sz="1600" dirty="0">
+                <a:latin typeface="Consolas" panose="020B0609020204030204" pitchFamily="49" charset="0"/>
+              </a:rPr>
+              <a:t> a b) ; works</a:t>
+            </a:r>
+          </a:p>
+          <a:p>
+            <a:pPr marL="0" indent="0">
+              <a:buNone/>
+            </a:pPr>
+            <a:r>
+              <a:rPr lang="en-US" sz="1600" dirty="0">
+                <a:latin typeface="Consolas" panose="020B0609020204030204" pitchFamily="49" charset="0"/>
+              </a:rPr>
+              <a:t>(define q 3)</a:t>
+            </a:r>
+          </a:p>
+          <a:p>
+            <a:pPr marL="0" indent="0">
+              <a:buNone/>
+            </a:pPr>
+            <a:r>
+              <a:rPr lang="en-US" sz="1600" dirty="0">
+                <a:latin typeface="Consolas" panose="020B0609020204030204" pitchFamily="49" charset="0"/>
+              </a:rPr>
+              <a:t>(define </a:t>
+            </a:r>
+            <a:r>
+              <a:rPr lang="en-US" sz="1600" dirty="0" err="1">
+                <a:latin typeface="Consolas" panose="020B0609020204030204" pitchFamily="49" charset="0"/>
+              </a:rPr>
+              <a:t>tmp</a:t>
+            </a:r>
+            <a:r>
+              <a:rPr lang="en-US" sz="1600" dirty="0">
+                <a:latin typeface="Consolas" panose="020B0609020204030204" pitchFamily="49" charset="0"/>
+              </a:rPr>
+              <a:t> 99)</a:t>
+            </a:r>
+          </a:p>
+          <a:p>
+            <a:pPr marL="0" indent="0">
+              <a:buNone/>
+            </a:pPr>
+            <a:r>
+              <a:rPr lang="en-US" sz="1600" dirty="0">
+                <a:latin typeface="Consolas" panose="020B0609020204030204" pitchFamily="49" charset="0"/>
+              </a:rPr>
+              <a:t>(</a:t>
+            </a:r>
+            <a:r>
+              <a:rPr lang="en-US" sz="1600" dirty="0" err="1">
+                <a:latin typeface="Consolas" panose="020B0609020204030204" pitchFamily="49" charset="0"/>
+              </a:rPr>
+              <a:t>badswap</a:t>
+            </a:r>
+            <a:r>
+              <a:rPr lang="en-US" sz="1600" dirty="0">
+                <a:latin typeface="Consolas" panose="020B0609020204030204" pitchFamily="49" charset="0"/>
+              </a:rPr>
+              <a:t> q </a:t>
+            </a:r>
+            <a:r>
+              <a:rPr lang="en-US" sz="1600" dirty="0" err="1">
+                <a:latin typeface="Consolas" panose="020B0609020204030204" pitchFamily="49" charset="0"/>
+              </a:rPr>
+              <a:t>tmp</a:t>
+            </a:r>
+            <a:r>
+              <a:rPr lang="en-US" sz="1600" dirty="0">
+                <a:latin typeface="Consolas" panose="020B0609020204030204" pitchFamily="49" charset="0"/>
+              </a:rPr>
+              <a:t>) ; variables are not swapped</a:t>
+            </a:r>
           </a:p>
         </p:txBody>
       </p:sp>
     </p:spTree>
     <p:extLst>
       <p:ext uri="{BB962C8B-B14F-4D97-AF65-F5344CB8AC3E}">
-        <p14:creationId xmlns:p14="http://schemas.microsoft.com/office/powerpoint/2010/main" val="898275119"/>
+        <p14:creationId xmlns:p14="http://schemas.microsoft.com/office/powerpoint/2010/main" val="3608643309"/>
       </p:ext>
     </p:extLst>
   </p:cSld>
@@ -7436,23 +8247,6 @@
 </file>
 
 <file path=customXml/item1.xml><?xml version="1.0" encoding="utf-8"?>
-<?mso-contentType ?>
-<FormTemplates xmlns="http://schemas.microsoft.com/sharepoint/v3/contenttype/forms">
-  <Display>DocumentLibraryForm</Display>
-  <Edit>DocumentLibraryForm</Edit>
-  <New>DocumentLibraryForm</New>
-</FormTemplates>
-</file>
-
-<file path=customXml/item2.xml><?xml version="1.0" encoding="utf-8"?>
-<p:properties xmlns:p="http://schemas.microsoft.com/office/2006/metadata/properties" xmlns:xsi="http://www.w3.org/2001/XMLSchema-instance" xmlns:pc="http://schemas.microsoft.com/office/infopath/2007/PartnerControls">
-  <documentManagement>
-    <_activity xmlns="5f5b6d61-0e5f-41fd-8596-a1256f5a83b0" xsi:nil="true"/>
-  </documentManagement>
-</p:properties>
-</file>
-
-<file path=customXml/item3.xml><?xml version="1.0" encoding="utf-8"?>
 <ct:contentTypeSchema xmlns:ct="http://schemas.microsoft.com/office/2006/metadata/contentType" xmlns:ma="http://schemas.microsoft.com/office/2006/metadata/properties/metaAttributes" ct:_="" ma:_="" ma:contentTypeName="Document" ma:contentTypeID="0x01010059CE426D428CEF499B332ADC3ADB3636" ma:contentTypeVersion="15" ma:contentTypeDescription="Create a new document." ma:contentTypeScope="" ma:versionID="33e6dfaf1a47dca333a7629626a3e18d">
   <xsd:schema xmlns:xsd="http://www.w3.org/2001/XMLSchema" xmlns:xs="http://www.w3.org/2001/XMLSchema" xmlns:p="http://schemas.microsoft.com/office/2006/metadata/properties" xmlns:ns3="5f5b6d61-0e5f-41fd-8596-a1256f5a83b0" xmlns:ns4="f0b9717a-2b57-40f9-a089-7ad30d640f15" targetNamespace="http://schemas.microsoft.com/office/2006/metadata/properties" ma:root="true" ma:fieldsID="9fc19125a57afee62d33e895960898df" ns3:_="" ns4:_="">
     <xsd:import namespace="5f5b6d61-0e5f-41fd-8596-a1256f5a83b0"/>
@@ -7687,10 +8481,38 @@
 </ct:contentTypeSchema>
 </file>
 
+<file path=customXml/item2.xml><?xml version="1.0" encoding="utf-8"?>
+<p:properties xmlns:p="http://schemas.microsoft.com/office/2006/metadata/properties" xmlns:xsi="http://www.w3.org/2001/XMLSchema-instance" xmlns:pc="http://schemas.microsoft.com/office/infopath/2007/PartnerControls">
+  <documentManagement>
+    <_activity xmlns="5f5b6d61-0e5f-41fd-8596-a1256f5a83b0" xsi:nil="true"/>
+  </documentManagement>
+</p:properties>
+</file>
+
+<file path=customXml/item3.xml><?xml version="1.0" encoding="utf-8"?>
+<?mso-contentType ?>
+<FormTemplates xmlns="http://schemas.microsoft.com/sharepoint/v3/contenttype/forms">
+  <Display>DocumentLibraryForm</Display>
+  <Edit>DocumentLibraryForm</Edit>
+  <New>DocumentLibraryForm</New>
+</FormTemplates>
+</file>
+
 <file path=customXml/itemProps1.xml><?xml version="1.0" encoding="utf-8"?>
-<ds:datastoreItem xmlns:ds="http://schemas.openxmlformats.org/officeDocument/2006/customXml" ds:itemID="{C23C1880-AA5B-4CD9-A675-31266D1AC92A}">
+<ds:datastoreItem xmlns:ds="http://schemas.openxmlformats.org/officeDocument/2006/customXml" ds:itemID="{E4B1A154-5096-4F87-8B15-AA00FED7786E}">
   <ds:schemaRefs>
-    <ds:schemaRef ds:uri="http://schemas.microsoft.com/sharepoint/v3/contenttype/forms"/>
+    <ds:schemaRef ds:uri="http://schemas.microsoft.com/office/2006/metadata/contentType"/>
+    <ds:schemaRef ds:uri="http://schemas.microsoft.com/office/2006/metadata/properties/metaAttributes"/>
+    <ds:schemaRef ds:uri="http://www.w3.org/2001/XMLSchema"/>
+    <ds:schemaRef ds:uri="http://schemas.microsoft.com/office/2006/metadata/properties"/>
+    <ds:schemaRef ds:uri="5f5b6d61-0e5f-41fd-8596-a1256f5a83b0"/>
+    <ds:schemaRef ds:uri="f0b9717a-2b57-40f9-a089-7ad30d640f15"/>
+    <ds:schemaRef ds:uri="http://schemas.microsoft.com/office/2006/documentManagement/types"/>
+    <ds:schemaRef ds:uri="http://schemas.microsoft.com/office/infopath/2007/PartnerControls"/>
+    <ds:schemaRef ds:uri="http://schemas.openxmlformats.org/package/2006/metadata/core-properties"/>
+    <ds:schemaRef ds:uri="http://purl.org/dc/elements/1.1/"/>
+    <ds:schemaRef ds:uri="http://purl.org/dc/terms/"/>
+    <ds:schemaRef ds:uri="http://schemas.microsoft.com/internal/obd"/>
   </ds:schemaRefs>
 </ds:datastoreItem>
 </file>
@@ -7713,20 +8535,9 @@
 </file>
 
 <file path=customXml/itemProps3.xml><?xml version="1.0" encoding="utf-8"?>
-<ds:datastoreItem xmlns:ds="http://schemas.openxmlformats.org/officeDocument/2006/customXml" ds:itemID="{E4B1A154-5096-4F87-8B15-AA00FED7786E}">
+<ds:datastoreItem xmlns:ds="http://schemas.openxmlformats.org/officeDocument/2006/customXml" ds:itemID="{C23C1880-AA5B-4CD9-A675-31266D1AC92A}">
   <ds:schemaRefs>
-    <ds:schemaRef ds:uri="http://schemas.microsoft.com/office/2006/metadata/contentType"/>
-    <ds:schemaRef ds:uri="http://schemas.microsoft.com/office/2006/metadata/properties/metaAttributes"/>
-    <ds:schemaRef ds:uri="http://www.w3.org/2001/XMLSchema"/>
-    <ds:schemaRef ds:uri="http://schemas.microsoft.com/office/2006/metadata/properties"/>
-    <ds:schemaRef ds:uri="5f5b6d61-0e5f-41fd-8596-a1256f5a83b0"/>
-    <ds:schemaRef ds:uri="f0b9717a-2b57-40f9-a089-7ad30d640f15"/>
-    <ds:schemaRef ds:uri="http://schemas.microsoft.com/office/2006/documentManagement/types"/>
-    <ds:schemaRef ds:uri="http://schemas.microsoft.com/office/infopath/2007/PartnerControls"/>
-    <ds:schemaRef ds:uri="http://schemas.openxmlformats.org/package/2006/metadata/core-properties"/>
-    <ds:schemaRef ds:uri="http://purl.org/dc/elements/1.1/"/>
-    <ds:schemaRef ds:uri="http://purl.org/dc/terms/"/>
-    <ds:schemaRef ds:uri="http://schemas.microsoft.com/internal/obd"/>
+    <ds:schemaRef ds:uri="http://schemas.microsoft.com/sharepoint/v3/contenttype/forms"/>
   </ds:schemaRefs>
 </ds:datastoreItem>
 </file>
</xml_diff>